<commit_message>
Fixed incorrectly saying dicts are unordered, added notice and modified version of the diagram to the sets presentation
</commit_message>
<xml_diff>
--- a/python/presentations/learning_python/18_ceda-sets.pptx
+++ b/python/presentations/learning_python/18_ceda-sets.pptx
@@ -5,19 +5,20 @@
     <p:sldMasterId id="2147483660" r:id="rId1"/>
   </p:sldMasterIdLst>
   <p:notesMasterIdLst>
-    <p:notesMasterId r:id="rId12"/>
+    <p:notesMasterId r:id="rId13"/>
   </p:notesMasterIdLst>
   <p:sldIdLst>
     <p:sldId id="270" r:id="rId2"/>
     <p:sldId id="261" r:id="rId3"/>
-    <p:sldId id="262" r:id="rId4"/>
-    <p:sldId id="263" r:id="rId5"/>
-    <p:sldId id="264" r:id="rId6"/>
-    <p:sldId id="265" r:id="rId7"/>
-    <p:sldId id="266" r:id="rId8"/>
-    <p:sldId id="267" r:id="rId9"/>
-    <p:sldId id="268" r:id="rId10"/>
-    <p:sldId id="269" r:id="rId11"/>
+    <p:sldId id="271" r:id="rId4"/>
+    <p:sldId id="262" r:id="rId5"/>
+    <p:sldId id="263" r:id="rId6"/>
+    <p:sldId id="264" r:id="rId7"/>
+    <p:sldId id="265" r:id="rId8"/>
+    <p:sldId id="266" r:id="rId9"/>
+    <p:sldId id="267" r:id="rId10"/>
+    <p:sldId id="268" r:id="rId11"/>
+    <p:sldId id="269" r:id="rId12"/>
   </p:sldIdLst>
   <p:sldSz cx="9144000" cy="6858000" type="screen4x3"/>
   <p:notesSz cx="6858000" cy="9144000"/>
@@ -259,7 +260,7 @@
               <a:pPr>
                 <a:defRPr/>
               </a:pPr>
-              <a:t>12/10/2018</a:t>
+              <a:t>17/12/2018</a:t>
             </a:fld>
             <a:endParaRPr lang="en-GB"/>
           </a:p>
@@ -985,7 +986,7 @@
             <a:fld id="{CF1C39F6-5F53-46C3-8DDC-404E3477002C}" type="slidenum">
               <a:rPr lang="en-GB" altLang="en-US" smtClean="0"/>
               <a:pPr/>
-              <a:t>3</a:t>
+              <a:t>4</a:t>
             </a:fld>
             <a:endParaRPr lang="en-GB" altLang="en-US" smtClean="0"/>
           </a:p>
@@ -1242,7 +1243,7 @@
             <a:fld id="{33DE1D3A-CCFB-4D45-AA35-4CB07A518716}" type="slidenum">
               <a:rPr lang="en-GB" altLang="en-US" smtClean="0"/>
               <a:pPr/>
-              <a:t>4</a:t>
+              <a:t>5</a:t>
             </a:fld>
             <a:endParaRPr lang="en-GB" altLang="en-US" smtClean="0"/>
           </a:p>
@@ -1499,7 +1500,7 @@
             <a:fld id="{97ACC91B-0AF1-4E1B-BCB5-7F357C0EC145}" type="slidenum">
               <a:rPr lang="en-GB" altLang="en-US" smtClean="0"/>
               <a:pPr/>
-              <a:t>5</a:t>
+              <a:t>6</a:t>
             </a:fld>
             <a:endParaRPr lang="en-GB" altLang="en-US" smtClean="0"/>
           </a:p>
@@ -1756,7 +1757,7 @@
             <a:fld id="{F5A454DE-B357-4313-AE16-0827D4E07455}" type="slidenum">
               <a:rPr lang="en-GB" altLang="en-US" smtClean="0"/>
               <a:pPr/>
-              <a:t>6</a:t>
+              <a:t>7</a:t>
             </a:fld>
             <a:endParaRPr lang="en-GB" altLang="en-US" smtClean="0"/>
           </a:p>
@@ -2013,7 +2014,7 @@
             <a:fld id="{744C32EE-18B9-493B-A0CE-C9BF1350399B}" type="slidenum">
               <a:rPr lang="en-GB" altLang="en-US" smtClean="0"/>
               <a:pPr/>
-              <a:t>7</a:t>
+              <a:t>8</a:t>
             </a:fld>
             <a:endParaRPr lang="en-GB" altLang="en-US" smtClean="0"/>
           </a:p>
@@ -2270,7 +2271,7 @@
             <a:fld id="{881DD040-4125-4D7B-9A0E-1D5544836C2E}" type="slidenum">
               <a:rPr lang="en-GB" altLang="en-US" smtClean="0"/>
               <a:pPr/>
-              <a:t>8</a:t>
+              <a:t>9</a:t>
             </a:fld>
             <a:endParaRPr lang="en-GB" altLang="en-US" smtClean="0"/>
           </a:p>
@@ -2527,7 +2528,7 @@
             <a:fld id="{DB9D41A0-7F87-4CE2-97B6-5CD688BE9735}" type="slidenum">
               <a:rPr lang="en-GB" altLang="en-US" smtClean="0"/>
               <a:pPr/>
-              <a:t>9</a:t>
+              <a:t>10</a:t>
             </a:fld>
             <a:endParaRPr lang="en-GB" altLang="en-US" smtClean="0"/>
           </a:p>
@@ -2784,7 +2785,7 @@
             <a:fld id="{006CE43B-95EE-4AF1-9B99-37561B7CB0DB}" type="slidenum">
               <a:rPr lang="en-GB" altLang="en-US" smtClean="0"/>
               <a:pPr/>
-              <a:t>10</a:t>
+              <a:t>11</a:t>
             </a:fld>
             <a:endParaRPr lang="en-GB" altLang="en-US" smtClean="0"/>
           </a:p>
@@ -3402,7 +3403,7 @@
               <a:pPr>
                 <a:defRPr/>
               </a:pPr>
-              <a:t>12/10/2018</a:t>
+              <a:t>17/12/2018</a:t>
             </a:fld>
             <a:endParaRPr lang="en-GB"/>
           </a:p>
@@ -3639,7 +3640,7 @@
               <a:pPr>
                 <a:defRPr/>
               </a:pPr>
-              <a:t>12/10/2018</a:t>
+              <a:t>17/12/2018</a:t>
             </a:fld>
             <a:endParaRPr lang="en-GB"/>
           </a:p>
@@ -4285,7 +4286,7 @@
               <a:pPr>
                 <a:defRPr/>
               </a:pPr>
-              <a:t>12/10/2018</a:t>
+              <a:t>17/12/2018</a:t>
             </a:fld>
             <a:endParaRPr lang="en-GB"/>
           </a:p>
@@ -5527,6 +5528,512 @@
       </p:grpSpPr>
       <p:sp>
         <p:nvSpPr>
+          <p:cNvPr id="3" name="Text Placeholder 2"/>
+          <p:cNvSpPr txBox="1">
+            <a:spLocks noGrp="1"/>
+          </p:cNvSpPr>
+          <p:nvPr>
+            <p:ph type="body" idx="4294967295"/>
+          </p:nvPr>
+        </p:nvSpPr>
+        <p:spPr>
+          <a:xfrm>
+            <a:off x="471488" y="1125538"/>
+            <a:ext cx="8228012" cy="4403725"/>
+          </a:xfrm>
+        </p:spPr>
+        <p:txBody>
+          <a:bodyPr rtlCol="0">
+            <a:normAutofit/>
+          </a:bodyPr>
+          <a:lstStyle/>
+          <a:p>
+            <a:pPr eaLnBrk="1" fontAlgn="auto" hangingPunct="1">
+              <a:spcAft>
+                <a:spcPts val="0"/>
+              </a:spcAft>
+              <a:defRPr/>
+            </a:pPr>
+            <a:r>
+              <a:rPr lang="en-GB" dirty="0">
+                <a:latin typeface="Nimbus Sans L" pitchFamily="34"/>
+              </a:rPr>
+              <a:t>returning a new set</a:t>
+            </a:r>
+            <a:br>
+              <a:rPr lang="en-GB" dirty="0">
+                <a:latin typeface="Nimbus Sans L" pitchFamily="34"/>
+              </a:rPr>
+            </a:br>
+            <a:endParaRPr lang="en-GB" sz="1400" dirty="0" smtClean="0">
+              <a:latin typeface="Nimbus Sans L" pitchFamily="34"/>
+            </a:endParaRPr>
+          </a:p>
+          <a:p>
+            <a:pPr marL="0" indent="0" eaLnBrk="1" fontAlgn="auto" hangingPunct="1">
+              <a:spcAft>
+                <a:spcPts val="0"/>
+              </a:spcAft>
+              <a:buFont typeface="Arial" panose="020B0604020202020204" pitchFamily="34" charset="0"/>
+              <a:buNone/>
+              <a:defRPr/>
+            </a:pPr>
+            <a:r>
+              <a:rPr lang="en-GB" sz="2400" dirty="0" smtClean="0">
+                <a:latin typeface="Courier New" panose="02070309020205020404" pitchFamily="49" charset="0"/>
+                <a:cs typeface="Courier New" panose="02070309020205020404" pitchFamily="49" charset="0"/>
+              </a:rPr>
+              <a:t>a </a:t>
+            </a:r>
+            <a:r>
+              <a:rPr lang="en-GB" sz="2400" dirty="0">
+                <a:latin typeface="Courier New" panose="02070309020205020404" pitchFamily="49" charset="0"/>
+                <a:cs typeface="Courier New" panose="02070309020205020404" pitchFamily="49" charset="0"/>
+              </a:rPr>
+              <a:t>= { 2, 3 }</a:t>
+            </a:r>
+          </a:p>
+          <a:p>
+            <a:pPr marL="0" indent="0" eaLnBrk="1" fontAlgn="auto" hangingPunct="1">
+              <a:spcAft>
+                <a:spcPts val="0"/>
+              </a:spcAft>
+              <a:buFont typeface="Arial" panose="020B0604020202020204" pitchFamily="34" charset="0"/>
+              <a:buNone/>
+              <a:defRPr/>
+            </a:pPr>
+            <a:r>
+              <a:rPr lang="en-GB" sz="2400" dirty="0">
+                <a:latin typeface="Courier New" panose="02070309020205020404" pitchFamily="49" charset="0"/>
+                <a:cs typeface="Courier New" panose="02070309020205020404" pitchFamily="49" charset="0"/>
+              </a:rPr>
+              <a:t>b = { 3, 4 }</a:t>
+            </a:r>
+            <a:br>
+              <a:rPr lang="en-GB" sz="2400" dirty="0">
+                <a:latin typeface="Courier New" panose="02070309020205020404" pitchFamily="49" charset="0"/>
+                <a:cs typeface="Courier New" panose="02070309020205020404" pitchFamily="49" charset="0"/>
+              </a:rPr>
+            </a:br>
+            <a:endParaRPr lang="en-GB" sz="2400" dirty="0">
+              <a:latin typeface="Courier New" panose="02070309020205020404" pitchFamily="49" charset="0"/>
+              <a:cs typeface="Courier New" panose="02070309020205020404" pitchFamily="49" charset="0"/>
+            </a:endParaRPr>
+          </a:p>
+          <a:p>
+            <a:pPr marL="0" indent="0" eaLnBrk="1" fontAlgn="auto" hangingPunct="1">
+              <a:spcAft>
+                <a:spcPts val="0"/>
+              </a:spcAft>
+              <a:buFont typeface="Arial" panose="020B0604020202020204" pitchFamily="34" charset="0"/>
+              <a:buNone/>
+              <a:defRPr/>
+            </a:pPr>
+            <a:r>
+              <a:rPr lang="en-GB" sz="2400" dirty="0">
+                <a:latin typeface="Courier New" panose="02070309020205020404" pitchFamily="49" charset="0"/>
+                <a:cs typeface="Courier New" panose="02070309020205020404" pitchFamily="49" charset="0"/>
+              </a:rPr>
+              <a:t>a | b    </a:t>
+            </a:r>
+            <a:r>
+              <a:rPr lang="en-GB" sz="2400" dirty="0" err="1">
+                <a:latin typeface="Courier New" panose="02070309020205020404" pitchFamily="49" charset="0"/>
+                <a:cs typeface="Courier New" panose="02070309020205020404" pitchFamily="49" charset="0"/>
+              </a:rPr>
+              <a:t>a.union</a:t>
+            </a:r>
+            <a:r>
+              <a:rPr lang="en-GB" sz="2400" dirty="0">
+                <a:latin typeface="Courier New" panose="02070309020205020404" pitchFamily="49" charset="0"/>
+                <a:cs typeface="Courier New" panose="02070309020205020404" pitchFamily="49" charset="0"/>
+              </a:rPr>
+              <a:t>(b)              </a:t>
+            </a:r>
+            <a:r>
+              <a:rPr lang="en-GB" sz="2400" i="1" dirty="0">
+                <a:solidFill>
+                  <a:srgbClr val="008000"/>
+                </a:solidFill>
+                <a:latin typeface="Courier New" panose="02070309020205020404" pitchFamily="49" charset="0"/>
+                <a:cs typeface="Courier New" panose="02070309020205020404" pitchFamily="49" charset="0"/>
+              </a:rPr>
+              <a:t>{2, 3, 4}</a:t>
+            </a:r>
+            <a:br>
+              <a:rPr lang="en-GB" sz="2400" i="1" dirty="0">
+                <a:solidFill>
+                  <a:srgbClr val="008000"/>
+                </a:solidFill>
+                <a:latin typeface="Courier New" panose="02070309020205020404" pitchFamily="49" charset="0"/>
+                <a:cs typeface="Courier New" panose="02070309020205020404" pitchFamily="49" charset="0"/>
+              </a:rPr>
+            </a:br>
+            <a:r>
+              <a:rPr lang="en-GB" sz="2400" dirty="0">
+                <a:latin typeface="Courier New" panose="02070309020205020404" pitchFamily="49" charset="0"/>
+                <a:cs typeface="Courier New" panose="02070309020205020404" pitchFamily="49" charset="0"/>
+              </a:rPr>
+              <a:t>a &amp; b    </a:t>
+            </a:r>
+            <a:r>
+              <a:rPr lang="en-GB" sz="2400" dirty="0" err="1">
+                <a:latin typeface="Courier New" panose="02070309020205020404" pitchFamily="49" charset="0"/>
+                <a:cs typeface="Courier New" panose="02070309020205020404" pitchFamily="49" charset="0"/>
+              </a:rPr>
+              <a:t>a.intersection</a:t>
+            </a:r>
+            <a:r>
+              <a:rPr lang="en-GB" sz="2400" dirty="0">
+                <a:latin typeface="Courier New" panose="02070309020205020404" pitchFamily="49" charset="0"/>
+                <a:cs typeface="Courier New" panose="02070309020205020404" pitchFamily="49" charset="0"/>
+              </a:rPr>
+              <a:t>(b)             </a:t>
+            </a:r>
+            <a:r>
+              <a:rPr lang="en-GB" sz="2400" i="1" dirty="0">
+                <a:solidFill>
+                  <a:srgbClr val="008000"/>
+                </a:solidFill>
+                <a:latin typeface="Courier New" panose="02070309020205020404" pitchFamily="49" charset="0"/>
+                <a:cs typeface="Courier New" panose="02070309020205020404" pitchFamily="49" charset="0"/>
+              </a:rPr>
+              <a:t>{3}</a:t>
+            </a:r>
+            <a:r>
+              <a:rPr lang="en-GB" sz="2400" dirty="0">
+                <a:latin typeface="Courier New" panose="02070309020205020404" pitchFamily="49" charset="0"/>
+                <a:cs typeface="Courier New" panose="02070309020205020404" pitchFamily="49" charset="0"/>
+              </a:rPr>
+              <a:t/>
+            </a:r>
+            <a:br>
+              <a:rPr lang="en-GB" sz="2400" dirty="0">
+                <a:latin typeface="Courier New" panose="02070309020205020404" pitchFamily="49" charset="0"/>
+                <a:cs typeface="Courier New" panose="02070309020205020404" pitchFamily="49" charset="0"/>
+              </a:rPr>
+            </a:br>
+            <a:r>
+              <a:rPr lang="en-GB" sz="2400" dirty="0">
+                <a:latin typeface="Courier New" panose="02070309020205020404" pitchFamily="49" charset="0"/>
+                <a:cs typeface="Courier New" panose="02070309020205020404" pitchFamily="49" charset="0"/>
+              </a:rPr>
+              <a:t>a - b    </a:t>
+            </a:r>
+            <a:r>
+              <a:rPr lang="en-GB" sz="2400" dirty="0" err="1">
+                <a:latin typeface="Courier New" panose="02070309020205020404" pitchFamily="49" charset="0"/>
+                <a:cs typeface="Courier New" panose="02070309020205020404" pitchFamily="49" charset="0"/>
+              </a:rPr>
+              <a:t>a.difference</a:t>
+            </a:r>
+            <a:r>
+              <a:rPr lang="en-GB" sz="2400" dirty="0">
+                <a:latin typeface="Courier New" panose="02070309020205020404" pitchFamily="49" charset="0"/>
+                <a:cs typeface="Courier New" panose="02070309020205020404" pitchFamily="49" charset="0"/>
+              </a:rPr>
+              <a:t>(b)               </a:t>
+            </a:r>
+            <a:r>
+              <a:rPr lang="en-GB" sz="2400" i="1" dirty="0">
+                <a:solidFill>
+                  <a:srgbClr val="008000"/>
+                </a:solidFill>
+                <a:latin typeface="Courier New" panose="02070309020205020404" pitchFamily="49" charset="0"/>
+                <a:cs typeface="Courier New" panose="02070309020205020404" pitchFamily="49" charset="0"/>
+              </a:rPr>
+              <a:t>{2}</a:t>
+            </a:r>
+            <a:r>
+              <a:rPr lang="en-GB" sz="2400" dirty="0">
+                <a:latin typeface="Courier New" panose="02070309020205020404" pitchFamily="49" charset="0"/>
+                <a:cs typeface="Courier New" panose="02070309020205020404" pitchFamily="49" charset="0"/>
+              </a:rPr>
+              <a:t/>
+            </a:r>
+            <a:br>
+              <a:rPr lang="en-GB" sz="2400" dirty="0">
+                <a:latin typeface="Courier New" panose="02070309020205020404" pitchFamily="49" charset="0"/>
+                <a:cs typeface="Courier New" panose="02070309020205020404" pitchFamily="49" charset="0"/>
+              </a:rPr>
+            </a:br>
+            <a:r>
+              <a:rPr lang="en-GB" sz="2400" dirty="0">
+                <a:latin typeface="Courier New" panose="02070309020205020404" pitchFamily="49" charset="0"/>
+                <a:cs typeface="Courier New" panose="02070309020205020404" pitchFamily="49" charset="0"/>
+              </a:rPr>
+              <a:t>a ^ b    </a:t>
+            </a:r>
+            <a:r>
+              <a:rPr lang="en-GB" sz="2400" dirty="0" err="1">
+                <a:latin typeface="Courier New" panose="02070309020205020404" pitchFamily="49" charset="0"/>
+                <a:cs typeface="Courier New" panose="02070309020205020404" pitchFamily="49" charset="0"/>
+              </a:rPr>
+              <a:t>a.symmetric_difference</a:t>
+            </a:r>
+            <a:r>
+              <a:rPr lang="en-GB" sz="2400" dirty="0">
+                <a:latin typeface="Courier New" panose="02070309020205020404" pitchFamily="49" charset="0"/>
+                <a:cs typeface="Courier New" panose="02070309020205020404" pitchFamily="49" charset="0"/>
+              </a:rPr>
+              <a:t>(b)  </a:t>
+            </a:r>
+            <a:r>
+              <a:rPr lang="en-GB" sz="2400" i="1" dirty="0">
+                <a:solidFill>
+                  <a:srgbClr val="008000"/>
+                </a:solidFill>
+                <a:latin typeface="Courier New" panose="02070309020205020404" pitchFamily="49" charset="0"/>
+                <a:cs typeface="Courier New" panose="02070309020205020404" pitchFamily="49" charset="0"/>
+              </a:rPr>
+              <a:t>{2, 4}</a:t>
+            </a:r>
+          </a:p>
+        </p:txBody>
+      </p:sp>
+      <p:sp>
+        <p:nvSpPr>
+          <p:cNvPr id="25603" name="Title 1"/>
+          <p:cNvSpPr txBox="1">
+            <a:spLocks/>
+          </p:cNvSpPr>
+          <p:nvPr/>
+        </p:nvSpPr>
+        <p:spPr bwMode="auto">
+          <a:xfrm>
+            <a:off x="468313" y="115888"/>
+            <a:ext cx="8229600" cy="1143000"/>
+          </a:xfrm>
+          <a:prstGeom prst="rect">
+            <a:avLst/>
+          </a:prstGeom>
+          <a:noFill/>
+          <a:ln>
+            <a:noFill/>
+          </a:ln>
+          <a:extLst>
+            <a:ext uri="{909E8E84-426E-40DD-AFC4-6F175D3DCCD1}">
+              <a14:hiddenFill xmlns:a14="http://schemas.microsoft.com/office/drawing/2010/main">
+                <a:solidFill>
+                  <a:srgbClr val="FFFFFF"/>
+                </a:solidFill>
+              </a14:hiddenFill>
+            </a:ext>
+            <a:ext uri="{91240B29-F687-4F45-9708-019B960494DF}">
+              <a14:hiddenLine xmlns:a14="http://schemas.microsoft.com/office/drawing/2010/main" w="9525">
+                <a:solidFill>
+                  <a:srgbClr val="000000"/>
+                </a:solidFill>
+                <a:miter lim="800000"/>
+                <a:headEnd/>
+                <a:tailEnd/>
+              </a14:hiddenLine>
+            </a:ext>
+          </a:extLst>
+        </p:spPr>
+        <p:txBody>
+          <a:bodyPr anchor="ctr"/>
+          <a:lstStyle>
+            <a:lvl1pPr>
+              <a:lnSpc>
+                <a:spcPct val="90000"/>
+              </a:lnSpc>
+              <a:spcBef>
+                <a:spcPts val="1000"/>
+              </a:spcBef>
+              <a:buFont typeface="Arial" panose="020B0604020202020204" pitchFamily="34" charset="0"/>
+              <a:buChar char="•"/>
+              <a:defRPr sz="2800">
+                <a:solidFill>
+                  <a:schemeClr val="tx1"/>
+                </a:solidFill>
+                <a:latin typeface="Calibri" panose="020F0502020204030204" pitchFamily="34" charset="0"/>
+              </a:defRPr>
+            </a:lvl1pPr>
+            <a:lvl2pPr marL="685800" indent="-228600">
+              <a:lnSpc>
+                <a:spcPct val="90000"/>
+              </a:lnSpc>
+              <a:spcBef>
+                <a:spcPts val="500"/>
+              </a:spcBef>
+              <a:buFont typeface="Arial" panose="020B0604020202020204" pitchFamily="34" charset="0"/>
+              <a:buChar char="•"/>
+              <a:defRPr sz="2400">
+                <a:solidFill>
+                  <a:schemeClr val="tx1"/>
+                </a:solidFill>
+                <a:latin typeface="Calibri" panose="020F0502020204030204" pitchFamily="34" charset="0"/>
+              </a:defRPr>
+            </a:lvl2pPr>
+            <a:lvl3pPr marL="1143000" indent="-228600">
+              <a:lnSpc>
+                <a:spcPct val="90000"/>
+              </a:lnSpc>
+              <a:spcBef>
+                <a:spcPts val="500"/>
+              </a:spcBef>
+              <a:buFont typeface="Arial" panose="020B0604020202020204" pitchFamily="34" charset="0"/>
+              <a:buChar char="•"/>
+              <a:defRPr sz="2000">
+                <a:solidFill>
+                  <a:schemeClr val="tx1"/>
+                </a:solidFill>
+                <a:latin typeface="Calibri" panose="020F0502020204030204" pitchFamily="34" charset="0"/>
+              </a:defRPr>
+            </a:lvl3pPr>
+            <a:lvl4pPr marL="1600200" indent="-228600">
+              <a:lnSpc>
+                <a:spcPct val="90000"/>
+              </a:lnSpc>
+              <a:spcBef>
+                <a:spcPts val="500"/>
+              </a:spcBef>
+              <a:buFont typeface="Arial" panose="020B0604020202020204" pitchFamily="34" charset="0"/>
+              <a:buChar char="•"/>
+              <a:defRPr>
+                <a:solidFill>
+                  <a:schemeClr val="tx1"/>
+                </a:solidFill>
+                <a:latin typeface="Calibri" panose="020F0502020204030204" pitchFamily="34" charset="0"/>
+              </a:defRPr>
+            </a:lvl4pPr>
+            <a:lvl5pPr marL="2057400" indent="-228600">
+              <a:lnSpc>
+                <a:spcPct val="90000"/>
+              </a:lnSpc>
+              <a:spcBef>
+                <a:spcPts val="500"/>
+              </a:spcBef>
+              <a:buFont typeface="Arial" panose="020B0604020202020204" pitchFamily="34" charset="0"/>
+              <a:buChar char="•"/>
+              <a:defRPr>
+                <a:solidFill>
+                  <a:schemeClr val="tx1"/>
+                </a:solidFill>
+                <a:latin typeface="Calibri" panose="020F0502020204030204" pitchFamily="34" charset="0"/>
+              </a:defRPr>
+            </a:lvl5pPr>
+            <a:lvl6pPr marL="2514600" indent="-228600" eaLnBrk="0" fontAlgn="base" hangingPunct="0">
+              <a:lnSpc>
+                <a:spcPct val="90000"/>
+              </a:lnSpc>
+              <a:spcBef>
+                <a:spcPts val="500"/>
+              </a:spcBef>
+              <a:spcAft>
+                <a:spcPct val="0"/>
+              </a:spcAft>
+              <a:buFont typeface="Arial" panose="020B0604020202020204" pitchFamily="34" charset="0"/>
+              <a:buChar char="•"/>
+              <a:defRPr>
+                <a:solidFill>
+                  <a:schemeClr val="tx1"/>
+                </a:solidFill>
+                <a:latin typeface="Calibri" panose="020F0502020204030204" pitchFamily="34" charset="0"/>
+              </a:defRPr>
+            </a:lvl6pPr>
+            <a:lvl7pPr marL="2971800" indent="-228600" eaLnBrk="0" fontAlgn="base" hangingPunct="0">
+              <a:lnSpc>
+                <a:spcPct val="90000"/>
+              </a:lnSpc>
+              <a:spcBef>
+                <a:spcPts val="500"/>
+              </a:spcBef>
+              <a:spcAft>
+                <a:spcPct val="0"/>
+              </a:spcAft>
+              <a:buFont typeface="Arial" panose="020B0604020202020204" pitchFamily="34" charset="0"/>
+              <a:buChar char="•"/>
+              <a:defRPr>
+                <a:solidFill>
+                  <a:schemeClr val="tx1"/>
+                </a:solidFill>
+                <a:latin typeface="Calibri" panose="020F0502020204030204" pitchFamily="34" charset="0"/>
+              </a:defRPr>
+            </a:lvl7pPr>
+            <a:lvl8pPr marL="3429000" indent="-228600" eaLnBrk="0" fontAlgn="base" hangingPunct="0">
+              <a:lnSpc>
+                <a:spcPct val="90000"/>
+              </a:lnSpc>
+              <a:spcBef>
+                <a:spcPts val="500"/>
+              </a:spcBef>
+              <a:spcAft>
+                <a:spcPct val="0"/>
+              </a:spcAft>
+              <a:buFont typeface="Arial" panose="020B0604020202020204" pitchFamily="34" charset="0"/>
+              <a:buChar char="•"/>
+              <a:defRPr>
+                <a:solidFill>
+                  <a:schemeClr val="tx1"/>
+                </a:solidFill>
+                <a:latin typeface="Calibri" panose="020F0502020204030204" pitchFamily="34" charset="0"/>
+              </a:defRPr>
+            </a:lvl8pPr>
+            <a:lvl9pPr marL="3886200" indent="-228600" eaLnBrk="0" fontAlgn="base" hangingPunct="0">
+              <a:lnSpc>
+                <a:spcPct val="90000"/>
+              </a:lnSpc>
+              <a:spcBef>
+                <a:spcPts val="500"/>
+              </a:spcBef>
+              <a:spcAft>
+                <a:spcPct val="0"/>
+              </a:spcAft>
+              <a:buFont typeface="Arial" panose="020B0604020202020204" pitchFamily="34" charset="0"/>
+              <a:buChar char="•"/>
+              <a:defRPr>
+                <a:solidFill>
+                  <a:schemeClr val="tx1"/>
+                </a:solidFill>
+                <a:latin typeface="Calibri" panose="020F0502020204030204" pitchFamily="34" charset="0"/>
+              </a:defRPr>
+            </a:lvl9pPr>
+          </a:lstStyle>
+          <a:p>
+            <a:pPr algn="ctr" eaLnBrk="1" hangingPunct="1">
+              <a:spcBef>
+                <a:spcPct val="0"/>
+              </a:spcBef>
+              <a:buFontTx/>
+              <a:buNone/>
+            </a:pPr>
+            <a:r>
+              <a:rPr lang="en-GB" altLang="en-US" sz="3200"/>
+              <a:t>Set combinators</a:t>
+            </a:r>
+          </a:p>
+        </p:txBody>
+      </p:sp>
+    </p:spTree>
+  </p:cSld>
+  <p:clrMapOvr>
+    <a:masterClrMapping/>
+  </p:clrMapOvr>
+  <p:transition spd="slow"/>
+</p:sld>
+</file>
+
+<file path=ppt/slides/slide11.xml><?xml version="1.0" encoding="utf-8"?>
+<p:sld xmlns:a="http://schemas.openxmlformats.org/drawingml/2006/main" xmlns:r="http://schemas.openxmlformats.org/officeDocument/2006/relationships" xmlns:p="http://schemas.openxmlformats.org/presentationml/2006/main">
+  <p:cSld>
+    <p:spTree>
+      <p:nvGrpSpPr>
+        <p:cNvPr id="1" name=""/>
+        <p:cNvGrpSpPr/>
+        <p:nvPr/>
+      </p:nvGrpSpPr>
+      <p:grpSpPr>
+        <a:xfrm>
+          <a:off x="0" y="0"/>
+          <a:ext cx="0" cy="0"/>
+          <a:chOff x="0" y="0"/>
+          <a:chExt cx="0" cy="0"/>
+        </a:xfrm>
+      </p:grpSpPr>
+      <p:sp>
+        <p:nvSpPr>
           <p:cNvPr id="27650" name="Title 1"/>
           <p:cNvSpPr>
             <a:spLocks noGrp="1"/>
@@ -6580,6 +7087,1402 @@
       </p:grpSpPr>
       <p:sp>
         <p:nvSpPr>
+          <p:cNvPr id="2" name="Cloud 1"/>
+          <p:cNvSpPr/>
+          <p:nvPr/>
+        </p:nvSpPr>
+        <p:spPr bwMode="auto">
+          <a:xfrm>
+            <a:off x="3311525" y="2289175"/>
+            <a:ext cx="2822575" cy="2765425"/>
+          </a:xfrm>
+          <a:prstGeom prst="cloud">
+            <a:avLst/>
+          </a:prstGeom>
+          <a:noFill/>
+          <a:ln w="9525" cap="flat" cmpd="sng" algn="ctr">
+            <a:solidFill>
+              <a:schemeClr val="tx1"/>
+            </a:solidFill>
+            <a:prstDash val="solid"/>
+            <a:round/>
+            <a:headEnd type="none" w="med" len="med"/>
+            <a:tailEnd type="none" w="med" len="med"/>
+          </a:ln>
+          <a:effectLst/>
+        </p:spPr>
+        <p:txBody>
+          <a:bodyPr/>
+          <a:lstStyle/>
+          <a:p>
+            <a:pPr eaLnBrk="1">
+              <a:lnSpc>
+                <a:spcPct val="93000"/>
+              </a:lnSpc>
+              <a:buClr>
+                <a:srgbClr val="000000"/>
+              </a:buClr>
+              <a:buSzPct val="100000"/>
+              <a:buFont typeface="Times New Roman" panose="02020603050405020304" pitchFamily="18" charset="0"/>
+              <a:buNone/>
+              <a:defRPr/>
+            </a:pPr>
+            <a:endParaRPr lang="en-US">
+              <a:ea typeface="+mn-ea"/>
+            </a:endParaRPr>
+          </a:p>
+        </p:txBody>
+      </p:sp>
+      <p:sp>
+        <p:nvSpPr>
+          <p:cNvPr id="4" name="Rectangle 4"/>
+          <p:cNvSpPr>
+            <a:spLocks noChangeArrowheads="1"/>
+          </p:cNvSpPr>
+          <p:nvPr/>
+        </p:nvSpPr>
+        <p:spPr bwMode="auto">
+          <a:xfrm>
+            <a:off x="4176713" y="2749550"/>
+            <a:ext cx="287337" cy="287338"/>
+          </a:xfrm>
+          <a:prstGeom prst="rect">
+            <a:avLst/>
+          </a:prstGeom>
+          <a:noFill/>
+          <a:ln w="9525">
+            <a:solidFill>
+              <a:schemeClr val="tx1"/>
+            </a:solidFill>
+            <a:round/>
+            <a:headEnd/>
+            <a:tailEnd/>
+          </a:ln>
+          <a:extLst>
+            <a:ext uri="{909E8E84-426E-40DD-AFC4-6F175D3DCCD1}">
+              <a14:hiddenFill xmlns:a14="http://schemas.microsoft.com/office/drawing/2010/main">
+                <a:solidFill>
+                  <a:srgbClr val="FFFFFF"/>
+                </a:solidFill>
+              </a14:hiddenFill>
+            </a:ext>
+          </a:extLst>
+        </p:spPr>
+        <p:txBody>
+          <a:bodyPr/>
+          <a:lstStyle/>
+          <a:p>
+            <a:pPr eaLnBrk="1">
+              <a:lnSpc>
+                <a:spcPct val="93000"/>
+              </a:lnSpc>
+              <a:buClr>
+                <a:srgbClr val="000000"/>
+              </a:buClr>
+              <a:buSzPct val="100000"/>
+              <a:buFont typeface="Times New Roman" panose="02020603050405020304" pitchFamily="18" charset="0"/>
+              <a:buNone/>
+            </a:pPr>
+            <a:endParaRPr lang="en-US" altLang="en-US"/>
+          </a:p>
+        </p:txBody>
+      </p:sp>
+      <p:sp>
+        <p:nvSpPr>
+          <p:cNvPr id="6" name="Rectangle 6"/>
+          <p:cNvSpPr>
+            <a:spLocks noChangeArrowheads="1"/>
+          </p:cNvSpPr>
+          <p:nvPr/>
+        </p:nvSpPr>
+        <p:spPr bwMode="auto">
+          <a:xfrm>
+            <a:off x="4060825" y="3843338"/>
+            <a:ext cx="288925" cy="288925"/>
+          </a:xfrm>
+          <a:prstGeom prst="rect">
+            <a:avLst/>
+          </a:prstGeom>
+          <a:noFill/>
+          <a:ln w="9525">
+            <a:solidFill>
+              <a:schemeClr val="tx1"/>
+            </a:solidFill>
+            <a:round/>
+            <a:headEnd/>
+            <a:tailEnd/>
+          </a:ln>
+          <a:extLst>
+            <a:ext uri="{909E8E84-426E-40DD-AFC4-6F175D3DCCD1}">
+              <a14:hiddenFill xmlns:a14="http://schemas.microsoft.com/office/drawing/2010/main">
+                <a:solidFill>
+                  <a:srgbClr val="FFFFFF"/>
+                </a:solidFill>
+              </a14:hiddenFill>
+            </a:ext>
+          </a:extLst>
+        </p:spPr>
+        <p:txBody>
+          <a:bodyPr/>
+          <a:lstStyle/>
+          <a:p>
+            <a:pPr eaLnBrk="1">
+              <a:lnSpc>
+                <a:spcPct val="93000"/>
+              </a:lnSpc>
+              <a:buClr>
+                <a:srgbClr val="000000"/>
+              </a:buClr>
+              <a:buSzPct val="100000"/>
+              <a:buFont typeface="Times New Roman" panose="02020603050405020304" pitchFamily="18" charset="0"/>
+              <a:buNone/>
+            </a:pPr>
+            <a:endParaRPr lang="en-US" altLang="en-US"/>
+          </a:p>
+        </p:txBody>
+      </p:sp>
+      <p:sp>
+        <p:nvSpPr>
+          <p:cNvPr id="8" name="Rectangle 8"/>
+          <p:cNvSpPr>
+            <a:spLocks noChangeArrowheads="1"/>
+          </p:cNvSpPr>
+          <p:nvPr/>
+        </p:nvSpPr>
+        <p:spPr bwMode="auto">
+          <a:xfrm>
+            <a:off x="5097463" y="3268663"/>
+            <a:ext cx="288925" cy="287337"/>
+          </a:xfrm>
+          <a:prstGeom prst="rect">
+            <a:avLst/>
+          </a:prstGeom>
+          <a:noFill/>
+          <a:ln w="9525">
+            <a:solidFill>
+              <a:schemeClr val="tx1"/>
+            </a:solidFill>
+            <a:round/>
+            <a:headEnd/>
+            <a:tailEnd/>
+          </a:ln>
+          <a:extLst>
+            <a:ext uri="{909E8E84-426E-40DD-AFC4-6F175D3DCCD1}">
+              <a14:hiddenFill xmlns:a14="http://schemas.microsoft.com/office/drawing/2010/main">
+                <a:solidFill>
+                  <a:srgbClr val="FFFFFF"/>
+                </a:solidFill>
+              </a14:hiddenFill>
+            </a:ext>
+          </a:extLst>
+        </p:spPr>
+        <p:txBody>
+          <a:bodyPr/>
+          <a:lstStyle/>
+          <a:p>
+            <a:pPr eaLnBrk="1">
+              <a:lnSpc>
+                <a:spcPct val="93000"/>
+              </a:lnSpc>
+              <a:buClr>
+                <a:srgbClr val="000000"/>
+              </a:buClr>
+              <a:buSzPct val="100000"/>
+              <a:buFont typeface="Times New Roman" panose="02020603050405020304" pitchFamily="18" charset="0"/>
+              <a:buNone/>
+            </a:pPr>
+            <a:endParaRPr lang="en-US" altLang="en-US"/>
+          </a:p>
+        </p:txBody>
+      </p:sp>
+      <p:cxnSp>
+        <p:nvCxnSpPr>
+          <p:cNvPr id="9" name="Straight Arrow Connector 10"/>
+          <p:cNvCxnSpPr>
+            <a:cxnSpLocks noChangeShapeType="1"/>
+          </p:cNvCxnSpPr>
+          <p:nvPr/>
+        </p:nvCxnSpPr>
+        <p:spPr bwMode="auto">
+          <a:xfrm rot="10800000">
+            <a:off x="3254375" y="2519363"/>
+            <a:ext cx="1036638" cy="403225"/>
+          </a:xfrm>
+          <a:prstGeom prst="straightConnector1">
+            <a:avLst/>
+          </a:prstGeom>
+          <a:noFill/>
+          <a:ln w="9525">
+            <a:solidFill>
+              <a:schemeClr val="tx1"/>
+            </a:solidFill>
+            <a:round/>
+            <a:headEnd/>
+            <a:tailEnd type="arrow" w="med" len="med"/>
+          </a:ln>
+          <a:extLst>
+            <a:ext uri="{909E8E84-426E-40DD-AFC4-6F175D3DCCD1}">
+              <a14:hiddenFill xmlns:a14="http://schemas.microsoft.com/office/drawing/2010/main">
+                <a:noFill/>
+              </a14:hiddenFill>
+            </a:ext>
+          </a:extLst>
+        </p:spPr>
+      </p:cxnSp>
+      <p:cxnSp>
+        <p:nvCxnSpPr>
+          <p:cNvPr id="11" name="Straight Arrow Connector 13"/>
+          <p:cNvCxnSpPr>
+            <a:cxnSpLocks noChangeShapeType="1"/>
+          </p:cNvCxnSpPr>
+          <p:nvPr/>
+        </p:nvCxnSpPr>
+        <p:spPr bwMode="auto">
+          <a:xfrm rot="10800000" flipV="1">
+            <a:off x="2967038" y="4016375"/>
+            <a:ext cx="1209675" cy="230188"/>
+          </a:xfrm>
+          <a:prstGeom prst="straightConnector1">
+            <a:avLst/>
+          </a:prstGeom>
+          <a:noFill/>
+          <a:ln w="9525">
+            <a:solidFill>
+              <a:schemeClr val="tx1"/>
+            </a:solidFill>
+            <a:round/>
+            <a:headEnd/>
+            <a:tailEnd type="arrow" w="med" len="med"/>
+          </a:ln>
+          <a:extLst>
+            <a:ext uri="{909E8E84-426E-40DD-AFC4-6F175D3DCCD1}">
+              <a14:hiddenFill xmlns:a14="http://schemas.microsoft.com/office/drawing/2010/main">
+                <a:noFill/>
+              </a14:hiddenFill>
+            </a:ext>
+          </a:extLst>
+        </p:spPr>
+      </p:cxnSp>
+      <p:cxnSp>
+        <p:nvCxnSpPr>
+          <p:cNvPr id="13" name="Straight Arrow Connector 18"/>
+          <p:cNvCxnSpPr>
+            <a:cxnSpLocks noChangeShapeType="1"/>
+          </p:cNvCxnSpPr>
+          <p:nvPr/>
+        </p:nvCxnSpPr>
+        <p:spPr bwMode="auto">
+          <a:xfrm flipV="1">
+            <a:off x="5270500" y="3036888"/>
+            <a:ext cx="1209675" cy="403225"/>
+          </a:xfrm>
+          <a:prstGeom prst="straightConnector1">
+            <a:avLst/>
+          </a:prstGeom>
+          <a:noFill/>
+          <a:ln w="9525">
+            <a:solidFill>
+              <a:schemeClr val="tx1"/>
+            </a:solidFill>
+            <a:round/>
+            <a:headEnd/>
+            <a:tailEnd type="arrow" w="med" len="med"/>
+          </a:ln>
+          <a:extLst>
+            <a:ext uri="{909E8E84-426E-40DD-AFC4-6F175D3DCCD1}">
+              <a14:hiddenFill xmlns:a14="http://schemas.microsoft.com/office/drawing/2010/main">
+                <a:noFill/>
+              </a14:hiddenFill>
+            </a:ext>
+          </a:extLst>
+        </p:spPr>
+      </p:cxnSp>
+      <p:sp>
+        <p:nvSpPr>
+          <p:cNvPr id="15" name="Text Box 2"/>
+          <p:cNvSpPr txBox="1">
+            <a:spLocks noChangeArrowheads="1"/>
+          </p:cNvSpPr>
+          <p:nvPr/>
+        </p:nvSpPr>
+        <p:spPr bwMode="auto">
+          <a:xfrm>
+            <a:off x="2144713" y="2230438"/>
+            <a:ext cx="1052512" cy="403225"/>
+          </a:xfrm>
+          <a:prstGeom prst="rect">
+            <a:avLst/>
+          </a:prstGeom>
+          <a:noFill/>
+          <a:ln>
+            <a:noFill/>
+          </a:ln>
+          <a:extLst>
+            <a:ext uri="{909E8E84-426E-40DD-AFC4-6F175D3DCCD1}">
+              <a14:hiddenFill xmlns:a14="http://schemas.microsoft.com/office/drawing/2010/main">
+                <a:solidFill>
+                  <a:srgbClr val="FFFFFF"/>
+                </a:solidFill>
+              </a14:hiddenFill>
+            </a:ext>
+            <a:ext uri="{91240B29-F687-4F45-9708-019B960494DF}">
+              <a14:hiddenLine xmlns:a14="http://schemas.microsoft.com/office/drawing/2010/main" w="9525">
+                <a:solidFill>
+                  <a:srgbClr val="000000"/>
+                </a:solidFill>
+                <a:round/>
+                <a:headEnd/>
+                <a:tailEnd/>
+              </a14:hiddenLine>
+            </a:ext>
+          </a:extLst>
+        </p:spPr>
+        <p:txBody>
+          <a:bodyPr wrap="none" lIns="90000" tIns="45000" rIns="90000" bIns="45000"/>
+          <a:lstStyle>
+            <a:lvl1pPr>
+              <a:tabLst>
+                <a:tab pos="723900" algn="l"/>
+                <a:tab pos="1447800" algn="l"/>
+                <a:tab pos="2171700" algn="l"/>
+                <a:tab pos="2895600" algn="l"/>
+                <a:tab pos="3619500" algn="l"/>
+                <a:tab pos="4343400" algn="l"/>
+                <a:tab pos="5067300" algn="l"/>
+                <a:tab pos="5791200" algn="l"/>
+                <a:tab pos="6515100" algn="l"/>
+                <a:tab pos="7239000" algn="l"/>
+                <a:tab pos="7962900" algn="l"/>
+              </a:tabLst>
+              <a:defRPr>
+                <a:solidFill>
+                  <a:schemeClr val="tx1"/>
+                </a:solidFill>
+                <a:latin typeface="Arial" panose="020B0604020202020204" pitchFamily="34" charset="0"/>
+                <a:ea typeface="Arial Unicode MS" pitchFamily="34" charset="-128"/>
+              </a:defRPr>
+            </a:lvl1pPr>
+            <a:lvl2pPr>
+              <a:tabLst>
+                <a:tab pos="723900" algn="l"/>
+                <a:tab pos="1447800" algn="l"/>
+                <a:tab pos="2171700" algn="l"/>
+                <a:tab pos="2895600" algn="l"/>
+                <a:tab pos="3619500" algn="l"/>
+                <a:tab pos="4343400" algn="l"/>
+                <a:tab pos="5067300" algn="l"/>
+                <a:tab pos="5791200" algn="l"/>
+                <a:tab pos="6515100" algn="l"/>
+                <a:tab pos="7239000" algn="l"/>
+                <a:tab pos="7962900" algn="l"/>
+              </a:tabLst>
+              <a:defRPr>
+                <a:solidFill>
+                  <a:schemeClr val="tx1"/>
+                </a:solidFill>
+                <a:latin typeface="Arial" panose="020B0604020202020204" pitchFamily="34" charset="0"/>
+                <a:ea typeface="Arial Unicode MS" pitchFamily="34" charset="-128"/>
+              </a:defRPr>
+            </a:lvl2pPr>
+            <a:lvl3pPr>
+              <a:tabLst>
+                <a:tab pos="723900" algn="l"/>
+                <a:tab pos="1447800" algn="l"/>
+                <a:tab pos="2171700" algn="l"/>
+                <a:tab pos="2895600" algn="l"/>
+                <a:tab pos="3619500" algn="l"/>
+                <a:tab pos="4343400" algn="l"/>
+                <a:tab pos="5067300" algn="l"/>
+                <a:tab pos="5791200" algn="l"/>
+                <a:tab pos="6515100" algn="l"/>
+                <a:tab pos="7239000" algn="l"/>
+                <a:tab pos="7962900" algn="l"/>
+              </a:tabLst>
+              <a:defRPr>
+                <a:solidFill>
+                  <a:schemeClr val="tx1"/>
+                </a:solidFill>
+                <a:latin typeface="Arial" panose="020B0604020202020204" pitchFamily="34" charset="0"/>
+                <a:ea typeface="Arial Unicode MS" pitchFamily="34" charset="-128"/>
+              </a:defRPr>
+            </a:lvl3pPr>
+            <a:lvl4pPr>
+              <a:tabLst>
+                <a:tab pos="723900" algn="l"/>
+                <a:tab pos="1447800" algn="l"/>
+                <a:tab pos="2171700" algn="l"/>
+                <a:tab pos="2895600" algn="l"/>
+                <a:tab pos="3619500" algn="l"/>
+                <a:tab pos="4343400" algn="l"/>
+                <a:tab pos="5067300" algn="l"/>
+                <a:tab pos="5791200" algn="l"/>
+                <a:tab pos="6515100" algn="l"/>
+                <a:tab pos="7239000" algn="l"/>
+                <a:tab pos="7962900" algn="l"/>
+              </a:tabLst>
+              <a:defRPr>
+                <a:solidFill>
+                  <a:schemeClr val="tx1"/>
+                </a:solidFill>
+                <a:latin typeface="Arial" panose="020B0604020202020204" pitchFamily="34" charset="0"/>
+                <a:ea typeface="Arial Unicode MS" pitchFamily="34" charset="-128"/>
+              </a:defRPr>
+            </a:lvl4pPr>
+            <a:lvl5pPr>
+              <a:tabLst>
+                <a:tab pos="723900" algn="l"/>
+                <a:tab pos="1447800" algn="l"/>
+                <a:tab pos="2171700" algn="l"/>
+                <a:tab pos="2895600" algn="l"/>
+                <a:tab pos="3619500" algn="l"/>
+                <a:tab pos="4343400" algn="l"/>
+                <a:tab pos="5067300" algn="l"/>
+                <a:tab pos="5791200" algn="l"/>
+                <a:tab pos="6515100" algn="l"/>
+                <a:tab pos="7239000" algn="l"/>
+                <a:tab pos="7962900" algn="l"/>
+              </a:tabLst>
+              <a:defRPr>
+                <a:solidFill>
+                  <a:schemeClr val="tx1"/>
+                </a:solidFill>
+                <a:latin typeface="Arial" panose="020B0604020202020204" pitchFamily="34" charset="0"/>
+                <a:ea typeface="Arial Unicode MS" pitchFamily="34" charset="-128"/>
+              </a:defRPr>
+            </a:lvl5pPr>
+            <a:lvl6pPr marL="2514600" indent="-228600" defTabSz="457200" eaLnBrk="0" fontAlgn="base" hangingPunct="0">
+              <a:spcBef>
+                <a:spcPct val="0"/>
+              </a:spcBef>
+              <a:spcAft>
+                <a:spcPct val="0"/>
+              </a:spcAft>
+              <a:tabLst>
+                <a:tab pos="723900" algn="l"/>
+                <a:tab pos="1447800" algn="l"/>
+                <a:tab pos="2171700" algn="l"/>
+                <a:tab pos="2895600" algn="l"/>
+                <a:tab pos="3619500" algn="l"/>
+                <a:tab pos="4343400" algn="l"/>
+                <a:tab pos="5067300" algn="l"/>
+                <a:tab pos="5791200" algn="l"/>
+                <a:tab pos="6515100" algn="l"/>
+                <a:tab pos="7239000" algn="l"/>
+                <a:tab pos="7962900" algn="l"/>
+              </a:tabLst>
+              <a:defRPr>
+                <a:solidFill>
+                  <a:schemeClr val="tx1"/>
+                </a:solidFill>
+                <a:latin typeface="Arial" panose="020B0604020202020204" pitchFamily="34" charset="0"/>
+                <a:ea typeface="Arial Unicode MS" pitchFamily="34" charset="-128"/>
+              </a:defRPr>
+            </a:lvl6pPr>
+            <a:lvl7pPr marL="2971800" indent="-228600" defTabSz="457200" eaLnBrk="0" fontAlgn="base" hangingPunct="0">
+              <a:spcBef>
+                <a:spcPct val="0"/>
+              </a:spcBef>
+              <a:spcAft>
+                <a:spcPct val="0"/>
+              </a:spcAft>
+              <a:tabLst>
+                <a:tab pos="723900" algn="l"/>
+                <a:tab pos="1447800" algn="l"/>
+                <a:tab pos="2171700" algn="l"/>
+                <a:tab pos="2895600" algn="l"/>
+                <a:tab pos="3619500" algn="l"/>
+                <a:tab pos="4343400" algn="l"/>
+                <a:tab pos="5067300" algn="l"/>
+                <a:tab pos="5791200" algn="l"/>
+                <a:tab pos="6515100" algn="l"/>
+                <a:tab pos="7239000" algn="l"/>
+                <a:tab pos="7962900" algn="l"/>
+              </a:tabLst>
+              <a:defRPr>
+                <a:solidFill>
+                  <a:schemeClr val="tx1"/>
+                </a:solidFill>
+                <a:latin typeface="Arial" panose="020B0604020202020204" pitchFamily="34" charset="0"/>
+                <a:ea typeface="Arial Unicode MS" pitchFamily="34" charset="-128"/>
+              </a:defRPr>
+            </a:lvl7pPr>
+            <a:lvl8pPr marL="3429000" indent="-228600" defTabSz="457200" eaLnBrk="0" fontAlgn="base" hangingPunct="0">
+              <a:spcBef>
+                <a:spcPct val="0"/>
+              </a:spcBef>
+              <a:spcAft>
+                <a:spcPct val="0"/>
+              </a:spcAft>
+              <a:tabLst>
+                <a:tab pos="723900" algn="l"/>
+                <a:tab pos="1447800" algn="l"/>
+                <a:tab pos="2171700" algn="l"/>
+                <a:tab pos="2895600" algn="l"/>
+                <a:tab pos="3619500" algn="l"/>
+                <a:tab pos="4343400" algn="l"/>
+                <a:tab pos="5067300" algn="l"/>
+                <a:tab pos="5791200" algn="l"/>
+                <a:tab pos="6515100" algn="l"/>
+                <a:tab pos="7239000" algn="l"/>
+                <a:tab pos="7962900" algn="l"/>
+              </a:tabLst>
+              <a:defRPr>
+                <a:solidFill>
+                  <a:schemeClr val="tx1"/>
+                </a:solidFill>
+                <a:latin typeface="Arial" panose="020B0604020202020204" pitchFamily="34" charset="0"/>
+                <a:ea typeface="Arial Unicode MS" pitchFamily="34" charset="-128"/>
+              </a:defRPr>
+            </a:lvl8pPr>
+            <a:lvl9pPr marL="3886200" indent="-228600" defTabSz="457200" eaLnBrk="0" fontAlgn="base" hangingPunct="0">
+              <a:spcBef>
+                <a:spcPct val="0"/>
+              </a:spcBef>
+              <a:spcAft>
+                <a:spcPct val="0"/>
+              </a:spcAft>
+              <a:tabLst>
+                <a:tab pos="723900" algn="l"/>
+                <a:tab pos="1447800" algn="l"/>
+                <a:tab pos="2171700" algn="l"/>
+                <a:tab pos="2895600" algn="l"/>
+                <a:tab pos="3619500" algn="l"/>
+                <a:tab pos="4343400" algn="l"/>
+                <a:tab pos="5067300" algn="l"/>
+                <a:tab pos="5791200" algn="l"/>
+                <a:tab pos="6515100" algn="l"/>
+                <a:tab pos="7239000" algn="l"/>
+                <a:tab pos="7962900" algn="l"/>
+              </a:tabLst>
+              <a:defRPr>
+                <a:solidFill>
+                  <a:schemeClr val="tx1"/>
+                </a:solidFill>
+                <a:latin typeface="Arial" panose="020B0604020202020204" pitchFamily="34" charset="0"/>
+                <a:ea typeface="Arial Unicode MS" pitchFamily="34" charset="-128"/>
+              </a:defRPr>
+            </a:lvl9pPr>
+          </a:lstStyle>
+          <a:p>
+            <a:pPr algn="ctr" eaLnBrk="1">
+              <a:lnSpc>
+                <a:spcPct val="93000"/>
+              </a:lnSpc>
+              <a:buClr>
+                <a:srgbClr val="000000"/>
+              </a:buClr>
+              <a:buSzPct val="100000"/>
+              <a:buFont typeface="Times New Roman" panose="02020603050405020304" pitchFamily="18" charset="0"/>
+              <a:buNone/>
+            </a:pPr>
+            <a:r>
+              <a:rPr lang="en-US" altLang="en-US" sz="2400">
+                <a:latin typeface="Courier New" panose="02070309020205020404" pitchFamily="49" charset="0"/>
+              </a:rPr>
+              <a:t>'Turing'</a:t>
+            </a:r>
+            <a:endParaRPr lang="pt-BR" altLang="en-US" sz="2400">
+              <a:latin typeface="Courier New" panose="02070309020205020404" pitchFamily="49" charset="0"/>
+            </a:endParaRPr>
+          </a:p>
+        </p:txBody>
+      </p:sp>
+      <p:sp>
+        <p:nvSpPr>
+          <p:cNvPr id="16" name="Text Box 2"/>
+          <p:cNvSpPr txBox="1">
+            <a:spLocks noChangeArrowheads="1"/>
+          </p:cNvSpPr>
+          <p:nvPr/>
+        </p:nvSpPr>
+        <p:spPr bwMode="auto">
+          <a:xfrm>
+            <a:off x="1763713" y="4075113"/>
+            <a:ext cx="1146175" cy="403225"/>
+          </a:xfrm>
+          <a:prstGeom prst="rect">
+            <a:avLst/>
+          </a:prstGeom>
+          <a:noFill/>
+          <a:ln>
+            <a:noFill/>
+          </a:ln>
+          <a:extLst>
+            <a:ext uri="{909E8E84-426E-40DD-AFC4-6F175D3DCCD1}">
+              <a14:hiddenFill xmlns:a14="http://schemas.microsoft.com/office/drawing/2010/main">
+                <a:solidFill>
+                  <a:srgbClr val="FFFFFF"/>
+                </a:solidFill>
+              </a14:hiddenFill>
+            </a:ext>
+            <a:ext uri="{91240B29-F687-4F45-9708-019B960494DF}">
+              <a14:hiddenLine xmlns:a14="http://schemas.microsoft.com/office/drawing/2010/main" w="9525">
+                <a:solidFill>
+                  <a:srgbClr val="000000"/>
+                </a:solidFill>
+                <a:round/>
+                <a:headEnd/>
+                <a:tailEnd/>
+              </a14:hiddenLine>
+            </a:ext>
+          </a:extLst>
+        </p:spPr>
+        <p:txBody>
+          <a:bodyPr wrap="none" lIns="90000" tIns="45000" rIns="90000" bIns="45000"/>
+          <a:lstStyle>
+            <a:lvl1pPr>
+              <a:tabLst>
+                <a:tab pos="723900" algn="l"/>
+                <a:tab pos="1447800" algn="l"/>
+                <a:tab pos="2171700" algn="l"/>
+                <a:tab pos="2895600" algn="l"/>
+                <a:tab pos="3619500" algn="l"/>
+                <a:tab pos="4343400" algn="l"/>
+                <a:tab pos="5067300" algn="l"/>
+                <a:tab pos="5791200" algn="l"/>
+                <a:tab pos="6515100" algn="l"/>
+                <a:tab pos="7239000" algn="l"/>
+                <a:tab pos="7962900" algn="l"/>
+              </a:tabLst>
+              <a:defRPr>
+                <a:solidFill>
+                  <a:schemeClr val="tx1"/>
+                </a:solidFill>
+                <a:latin typeface="Arial" panose="020B0604020202020204" pitchFamily="34" charset="0"/>
+                <a:ea typeface="Arial Unicode MS" pitchFamily="34" charset="-128"/>
+              </a:defRPr>
+            </a:lvl1pPr>
+            <a:lvl2pPr>
+              <a:tabLst>
+                <a:tab pos="723900" algn="l"/>
+                <a:tab pos="1447800" algn="l"/>
+                <a:tab pos="2171700" algn="l"/>
+                <a:tab pos="2895600" algn="l"/>
+                <a:tab pos="3619500" algn="l"/>
+                <a:tab pos="4343400" algn="l"/>
+                <a:tab pos="5067300" algn="l"/>
+                <a:tab pos="5791200" algn="l"/>
+                <a:tab pos="6515100" algn="l"/>
+                <a:tab pos="7239000" algn="l"/>
+                <a:tab pos="7962900" algn="l"/>
+              </a:tabLst>
+              <a:defRPr>
+                <a:solidFill>
+                  <a:schemeClr val="tx1"/>
+                </a:solidFill>
+                <a:latin typeface="Arial" panose="020B0604020202020204" pitchFamily="34" charset="0"/>
+                <a:ea typeface="Arial Unicode MS" pitchFamily="34" charset="-128"/>
+              </a:defRPr>
+            </a:lvl2pPr>
+            <a:lvl3pPr>
+              <a:tabLst>
+                <a:tab pos="723900" algn="l"/>
+                <a:tab pos="1447800" algn="l"/>
+                <a:tab pos="2171700" algn="l"/>
+                <a:tab pos="2895600" algn="l"/>
+                <a:tab pos="3619500" algn="l"/>
+                <a:tab pos="4343400" algn="l"/>
+                <a:tab pos="5067300" algn="l"/>
+                <a:tab pos="5791200" algn="l"/>
+                <a:tab pos="6515100" algn="l"/>
+                <a:tab pos="7239000" algn="l"/>
+                <a:tab pos="7962900" algn="l"/>
+              </a:tabLst>
+              <a:defRPr>
+                <a:solidFill>
+                  <a:schemeClr val="tx1"/>
+                </a:solidFill>
+                <a:latin typeface="Arial" panose="020B0604020202020204" pitchFamily="34" charset="0"/>
+                <a:ea typeface="Arial Unicode MS" pitchFamily="34" charset="-128"/>
+              </a:defRPr>
+            </a:lvl3pPr>
+            <a:lvl4pPr>
+              <a:tabLst>
+                <a:tab pos="723900" algn="l"/>
+                <a:tab pos="1447800" algn="l"/>
+                <a:tab pos="2171700" algn="l"/>
+                <a:tab pos="2895600" algn="l"/>
+                <a:tab pos="3619500" algn="l"/>
+                <a:tab pos="4343400" algn="l"/>
+                <a:tab pos="5067300" algn="l"/>
+                <a:tab pos="5791200" algn="l"/>
+                <a:tab pos="6515100" algn="l"/>
+                <a:tab pos="7239000" algn="l"/>
+                <a:tab pos="7962900" algn="l"/>
+              </a:tabLst>
+              <a:defRPr>
+                <a:solidFill>
+                  <a:schemeClr val="tx1"/>
+                </a:solidFill>
+                <a:latin typeface="Arial" panose="020B0604020202020204" pitchFamily="34" charset="0"/>
+                <a:ea typeface="Arial Unicode MS" pitchFamily="34" charset="-128"/>
+              </a:defRPr>
+            </a:lvl4pPr>
+            <a:lvl5pPr>
+              <a:tabLst>
+                <a:tab pos="723900" algn="l"/>
+                <a:tab pos="1447800" algn="l"/>
+                <a:tab pos="2171700" algn="l"/>
+                <a:tab pos="2895600" algn="l"/>
+                <a:tab pos="3619500" algn="l"/>
+                <a:tab pos="4343400" algn="l"/>
+                <a:tab pos="5067300" algn="l"/>
+                <a:tab pos="5791200" algn="l"/>
+                <a:tab pos="6515100" algn="l"/>
+                <a:tab pos="7239000" algn="l"/>
+                <a:tab pos="7962900" algn="l"/>
+              </a:tabLst>
+              <a:defRPr>
+                <a:solidFill>
+                  <a:schemeClr val="tx1"/>
+                </a:solidFill>
+                <a:latin typeface="Arial" panose="020B0604020202020204" pitchFamily="34" charset="0"/>
+                <a:ea typeface="Arial Unicode MS" pitchFamily="34" charset="-128"/>
+              </a:defRPr>
+            </a:lvl5pPr>
+            <a:lvl6pPr marL="2514600" indent="-228600" defTabSz="457200" eaLnBrk="0" fontAlgn="base" hangingPunct="0">
+              <a:spcBef>
+                <a:spcPct val="0"/>
+              </a:spcBef>
+              <a:spcAft>
+                <a:spcPct val="0"/>
+              </a:spcAft>
+              <a:tabLst>
+                <a:tab pos="723900" algn="l"/>
+                <a:tab pos="1447800" algn="l"/>
+                <a:tab pos="2171700" algn="l"/>
+                <a:tab pos="2895600" algn="l"/>
+                <a:tab pos="3619500" algn="l"/>
+                <a:tab pos="4343400" algn="l"/>
+                <a:tab pos="5067300" algn="l"/>
+                <a:tab pos="5791200" algn="l"/>
+                <a:tab pos="6515100" algn="l"/>
+                <a:tab pos="7239000" algn="l"/>
+                <a:tab pos="7962900" algn="l"/>
+              </a:tabLst>
+              <a:defRPr>
+                <a:solidFill>
+                  <a:schemeClr val="tx1"/>
+                </a:solidFill>
+                <a:latin typeface="Arial" panose="020B0604020202020204" pitchFamily="34" charset="0"/>
+                <a:ea typeface="Arial Unicode MS" pitchFamily="34" charset="-128"/>
+              </a:defRPr>
+            </a:lvl6pPr>
+            <a:lvl7pPr marL="2971800" indent="-228600" defTabSz="457200" eaLnBrk="0" fontAlgn="base" hangingPunct="0">
+              <a:spcBef>
+                <a:spcPct val="0"/>
+              </a:spcBef>
+              <a:spcAft>
+                <a:spcPct val="0"/>
+              </a:spcAft>
+              <a:tabLst>
+                <a:tab pos="723900" algn="l"/>
+                <a:tab pos="1447800" algn="l"/>
+                <a:tab pos="2171700" algn="l"/>
+                <a:tab pos="2895600" algn="l"/>
+                <a:tab pos="3619500" algn="l"/>
+                <a:tab pos="4343400" algn="l"/>
+                <a:tab pos="5067300" algn="l"/>
+                <a:tab pos="5791200" algn="l"/>
+                <a:tab pos="6515100" algn="l"/>
+                <a:tab pos="7239000" algn="l"/>
+                <a:tab pos="7962900" algn="l"/>
+              </a:tabLst>
+              <a:defRPr>
+                <a:solidFill>
+                  <a:schemeClr val="tx1"/>
+                </a:solidFill>
+                <a:latin typeface="Arial" panose="020B0604020202020204" pitchFamily="34" charset="0"/>
+                <a:ea typeface="Arial Unicode MS" pitchFamily="34" charset="-128"/>
+              </a:defRPr>
+            </a:lvl7pPr>
+            <a:lvl8pPr marL="3429000" indent="-228600" defTabSz="457200" eaLnBrk="0" fontAlgn="base" hangingPunct="0">
+              <a:spcBef>
+                <a:spcPct val="0"/>
+              </a:spcBef>
+              <a:spcAft>
+                <a:spcPct val="0"/>
+              </a:spcAft>
+              <a:tabLst>
+                <a:tab pos="723900" algn="l"/>
+                <a:tab pos="1447800" algn="l"/>
+                <a:tab pos="2171700" algn="l"/>
+                <a:tab pos="2895600" algn="l"/>
+                <a:tab pos="3619500" algn="l"/>
+                <a:tab pos="4343400" algn="l"/>
+                <a:tab pos="5067300" algn="l"/>
+                <a:tab pos="5791200" algn="l"/>
+                <a:tab pos="6515100" algn="l"/>
+                <a:tab pos="7239000" algn="l"/>
+                <a:tab pos="7962900" algn="l"/>
+              </a:tabLst>
+              <a:defRPr>
+                <a:solidFill>
+                  <a:schemeClr val="tx1"/>
+                </a:solidFill>
+                <a:latin typeface="Arial" panose="020B0604020202020204" pitchFamily="34" charset="0"/>
+                <a:ea typeface="Arial Unicode MS" pitchFamily="34" charset="-128"/>
+              </a:defRPr>
+            </a:lvl8pPr>
+            <a:lvl9pPr marL="3886200" indent="-228600" defTabSz="457200" eaLnBrk="0" fontAlgn="base" hangingPunct="0">
+              <a:spcBef>
+                <a:spcPct val="0"/>
+              </a:spcBef>
+              <a:spcAft>
+                <a:spcPct val="0"/>
+              </a:spcAft>
+              <a:tabLst>
+                <a:tab pos="723900" algn="l"/>
+                <a:tab pos="1447800" algn="l"/>
+                <a:tab pos="2171700" algn="l"/>
+                <a:tab pos="2895600" algn="l"/>
+                <a:tab pos="3619500" algn="l"/>
+                <a:tab pos="4343400" algn="l"/>
+                <a:tab pos="5067300" algn="l"/>
+                <a:tab pos="5791200" algn="l"/>
+                <a:tab pos="6515100" algn="l"/>
+                <a:tab pos="7239000" algn="l"/>
+                <a:tab pos="7962900" algn="l"/>
+              </a:tabLst>
+              <a:defRPr>
+                <a:solidFill>
+                  <a:schemeClr val="tx1"/>
+                </a:solidFill>
+                <a:latin typeface="Arial" panose="020B0604020202020204" pitchFamily="34" charset="0"/>
+                <a:ea typeface="Arial Unicode MS" pitchFamily="34" charset="-128"/>
+              </a:defRPr>
+            </a:lvl9pPr>
+          </a:lstStyle>
+          <a:p>
+            <a:pPr algn="ctr" eaLnBrk="1">
+              <a:lnSpc>
+                <a:spcPct val="93000"/>
+              </a:lnSpc>
+              <a:buClr>
+                <a:srgbClr val="000000"/>
+              </a:buClr>
+              <a:buSzPct val="100000"/>
+              <a:buFont typeface="Times New Roman" panose="02020603050405020304" pitchFamily="18" charset="0"/>
+              <a:buNone/>
+            </a:pPr>
+            <a:r>
+              <a:rPr lang="en-US" altLang="en-US" sz="2400">
+                <a:latin typeface="Courier New" panose="02070309020205020404" pitchFamily="49" charset="0"/>
+              </a:rPr>
+              <a:t>'Newton'</a:t>
+            </a:r>
+            <a:endParaRPr lang="pt-BR" altLang="en-US" sz="2400">
+              <a:latin typeface="Courier New" panose="02070309020205020404" pitchFamily="49" charset="0"/>
+            </a:endParaRPr>
+          </a:p>
+        </p:txBody>
+      </p:sp>
+      <p:sp>
+        <p:nvSpPr>
+          <p:cNvPr id="17" name="Text Box 2"/>
+          <p:cNvSpPr txBox="1">
+            <a:spLocks noChangeArrowheads="1"/>
+          </p:cNvSpPr>
+          <p:nvPr/>
+        </p:nvSpPr>
+        <p:spPr bwMode="auto">
+          <a:xfrm>
+            <a:off x="6596063" y="2806700"/>
+            <a:ext cx="1111250" cy="404813"/>
+          </a:xfrm>
+          <a:prstGeom prst="rect">
+            <a:avLst/>
+          </a:prstGeom>
+          <a:noFill/>
+          <a:ln>
+            <a:noFill/>
+          </a:ln>
+          <a:extLst>
+            <a:ext uri="{909E8E84-426E-40DD-AFC4-6F175D3DCCD1}">
+              <a14:hiddenFill xmlns:a14="http://schemas.microsoft.com/office/drawing/2010/main">
+                <a:solidFill>
+                  <a:srgbClr val="FFFFFF"/>
+                </a:solidFill>
+              </a14:hiddenFill>
+            </a:ext>
+            <a:ext uri="{91240B29-F687-4F45-9708-019B960494DF}">
+              <a14:hiddenLine xmlns:a14="http://schemas.microsoft.com/office/drawing/2010/main" w="9525">
+                <a:solidFill>
+                  <a:srgbClr val="000000"/>
+                </a:solidFill>
+                <a:round/>
+                <a:headEnd/>
+                <a:tailEnd/>
+              </a14:hiddenLine>
+            </a:ext>
+          </a:extLst>
+        </p:spPr>
+        <p:txBody>
+          <a:bodyPr wrap="none" lIns="90000" tIns="45000" rIns="90000" bIns="45000"/>
+          <a:lstStyle>
+            <a:lvl1pPr>
+              <a:tabLst>
+                <a:tab pos="723900" algn="l"/>
+                <a:tab pos="1447800" algn="l"/>
+                <a:tab pos="2171700" algn="l"/>
+                <a:tab pos="2895600" algn="l"/>
+                <a:tab pos="3619500" algn="l"/>
+                <a:tab pos="4343400" algn="l"/>
+                <a:tab pos="5067300" algn="l"/>
+                <a:tab pos="5791200" algn="l"/>
+                <a:tab pos="6515100" algn="l"/>
+                <a:tab pos="7239000" algn="l"/>
+                <a:tab pos="7962900" algn="l"/>
+              </a:tabLst>
+              <a:defRPr>
+                <a:solidFill>
+                  <a:schemeClr val="tx1"/>
+                </a:solidFill>
+                <a:latin typeface="Arial" panose="020B0604020202020204" pitchFamily="34" charset="0"/>
+                <a:ea typeface="Arial Unicode MS" pitchFamily="34" charset="-128"/>
+              </a:defRPr>
+            </a:lvl1pPr>
+            <a:lvl2pPr>
+              <a:tabLst>
+                <a:tab pos="723900" algn="l"/>
+                <a:tab pos="1447800" algn="l"/>
+                <a:tab pos="2171700" algn="l"/>
+                <a:tab pos="2895600" algn="l"/>
+                <a:tab pos="3619500" algn="l"/>
+                <a:tab pos="4343400" algn="l"/>
+                <a:tab pos="5067300" algn="l"/>
+                <a:tab pos="5791200" algn="l"/>
+                <a:tab pos="6515100" algn="l"/>
+                <a:tab pos="7239000" algn="l"/>
+                <a:tab pos="7962900" algn="l"/>
+              </a:tabLst>
+              <a:defRPr>
+                <a:solidFill>
+                  <a:schemeClr val="tx1"/>
+                </a:solidFill>
+                <a:latin typeface="Arial" panose="020B0604020202020204" pitchFamily="34" charset="0"/>
+                <a:ea typeface="Arial Unicode MS" pitchFamily="34" charset="-128"/>
+              </a:defRPr>
+            </a:lvl2pPr>
+            <a:lvl3pPr>
+              <a:tabLst>
+                <a:tab pos="723900" algn="l"/>
+                <a:tab pos="1447800" algn="l"/>
+                <a:tab pos="2171700" algn="l"/>
+                <a:tab pos="2895600" algn="l"/>
+                <a:tab pos="3619500" algn="l"/>
+                <a:tab pos="4343400" algn="l"/>
+                <a:tab pos="5067300" algn="l"/>
+                <a:tab pos="5791200" algn="l"/>
+                <a:tab pos="6515100" algn="l"/>
+                <a:tab pos="7239000" algn="l"/>
+                <a:tab pos="7962900" algn="l"/>
+              </a:tabLst>
+              <a:defRPr>
+                <a:solidFill>
+                  <a:schemeClr val="tx1"/>
+                </a:solidFill>
+                <a:latin typeface="Arial" panose="020B0604020202020204" pitchFamily="34" charset="0"/>
+                <a:ea typeface="Arial Unicode MS" pitchFamily="34" charset="-128"/>
+              </a:defRPr>
+            </a:lvl3pPr>
+            <a:lvl4pPr>
+              <a:tabLst>
+                <a:tab pos="723900" algn="l"/>
+                <a:tab pos="1447800" algn="l"/>
+                <a:tab pos="2171700" algn="l"/>
+                <a:tab pos="2895600" algn="l"/>
+                <a:tab pos="3619500" algn="l"/>
+                <a:tab pos="4343400" algn="l"/>
+                <a:tab pos="5067300" algn="l"/>
+                <a:tab pos="5791200" algn="l"/>
+                <a:tab pos="6515100" algn="l"/>
+                <a:tab pos="7239000" algn="l"/>
+                <a:tab pos="7962900" algn="l"/>
+              </a:tabLst>
+              <a:defRPr>
+                <a:solidFill>
+                  <a:schemeClr val="tx1"/>
+                </a:solidFill>
+                <a:latin typeface="Arial" panose="020B0604020202020204" pitchFamily="34" charset="0"/>
+                <a:ea typeface="Arial Unicode MS" pitchFamily="34" charset="-128"/>
+              </a:defRPr>
+            </a:lvl4pPr>
+            <a:lvl5pPr>
+              <a:tabLst>
+                <a:tab pos="723900" algn="l"/>
+                <a:tab pos="1447800" algn="l"/>
+                <a:tab pos="2171700" algn="l"/>
+                <a:tab pos="2895600" algn="l"/>
+                <a:tab pos="3619500" algn="l"/>
+                <a:tab pos="4343400" algn="l"/>
+                <a:tab pos="5067300" algn="l"/>
+                <a:tab pos="5791200" algn="l"/>
+                <a:tab pos="6515100" algn="l"/>
+                <a:tab pos="7239000" algn="l"/>
+                <a:tab pos="7962900" algn="l"/>
+              </a:tabLst>
+              <a:defRPr>
+                <a:solidFill>
+                  <a:schemeClr val="tx1"/>
+                </a:solidFill>
+                <a:latin typeface="Arial" panose="020B0604020202020204" pitchFamily="34" charset="0"/>
+                <a:ea typeface="Arial Unicode MS" pitchFamily="34" charset="-128"/>
+              </a:defRPr>
+            </a:lvl5pPr>
+            <a:lvl6pPr marL="2514600" indent="-228600" defTabSz="457200" eaLnBrk="0" fontAlgn="base" hangingPunct="0">
+              <a:spcBef>
+                <a:spcPct val="0"/>
+              </a:spcBef>
+              <a:spcAft>
+                <a:spcPct val="0"/>
+              </a:spcAft>
+              <a:tabLst>
+                <a:tab pos="723900" algn="l"/>
+                <a:tab pos="1447800" algn="l"/>
+                <a:tab pos="2171700" algn="l"/>
+                <a:tab pos="2895600" algn="l"/>
+                <a:tab pos="3619500" algn="l"/>
+                <a:tab pos="4343400" algn="l"/>
+                <a:tab pos="5067300" algn="l"/>
+                <a:tab pos="5791200" algn="l"/>
+                <a:tab pos="6515100" algn="l"/>
+                <a:tab pos="7239000" algn="l"/>
+                <a:tab pos="7962900" algn="l"/>
+              </a:tabLst>
+              <a:defRPr>
+                <a:solidFill>
+                  <a:schemeClr val="tx1"/>
+                </a:solidFill>
+                <a:latin typeface="Arial" panose="020B0604020202020204" pitchFamily="34" charset="0"/>
+                <a:ea typeface="Arial Unicode MS" pitchFamily="34" charset="-128"/>
+              </a:defRPr>
+            </a:lvl6pPr>
+            <a:lvl7pPr marL="2971800" indent="-228600" defTabSz="457200" eaLnBrk="0" fontAlgn="base" hangingPunct="0">
+              <a:spcBef>
+                <a:spcPct val="0"/>
+              </a:spcBef>
+              <a:spcAft>
+                <a:spcPct val="0"/>
+              </a:spcAft>
+              <a:tabLst>
+                <a:tab pos="723900" algn="l"/>
+                <a:tab pos="1447800" algn="l"/>
+                <a:tab pos="2171700" algn="l"/>
+                <a:tab pos="2895600" algn="l"/>
+                <a:tab pos="3619500" algn="l"/>
+                <a:tab pos="4343400" algn="l"/>
+                <a:tab pos="5067300" algn="l"/>
+                <a:tab pos="5791200" algn="l"/>
+                <a:tab pos="6515100" algn="l"/>
+                <a:tab pos="7239000" algn="l"/>
+                <a:tab pos="7962900" algn="l"/>
+              </a:tabLst>
+              <a:defRPr>
+                <a:solidFill>
+                  <a:schemeClr val="tx1"/>
+                </a:solidFill>
+                <a:latin typeface="Arial" panose="020B0604020202020204" pitchFamily="34" charset="0"/>
+                <a:ea typeface="Arial Unicode MS" pitchFamily="34" charset="-128"/>
+              </a:defRPr>
+            </a:lvl7pPr>
+            <a:lvl8pPr marL="3429000" indent="-228600" defTabSz="457200" eaLnBrk="0" fontAlgn="base" hangingPunct="0">
+              <a:spcBef>
+                <a:spcPct val="0"/>
+              </a:spcBef>
+              <a:spcAft>
+                <a:spcPct val="0"/>
+              </a:spcAft>
+              <a:tabLst>
+                <a:tab pos="723900" algn="l"/>
+                <a:tab pos="1447800" algn="l"/>
+                <a:tab pos="2171700" algn="l"/>
+                <a:tab pos="2895600" algn="l"/>
+                <a:tab pos="3619500" algn="l"/>
+                <a:tab pos="4343400" algn="l"/>
+                <a:tab pos="5067300" algn="l"/>
+                <a:tab pos="5791200" algn="l"/>
+                <a:tab pos="6515100" algn="l"/>
+                <a:tab pos="7239000" algn="l"/>
+                <a:tab pos="7962900" algn="l"/>
+              </a:tabLst>
+              <a:defRPr>
+                <a:solidFill>
+                  <a:schemeClr val="tx1"/>
+                </a:solidFill>
+                <a:latin typeface="Arial" panose="020B0604020202020204" pitchFamily="34" charset="0"/>
+                <a:ea typeface="Arial Unicode MS" pitchFamily="34" charset="-128"/>
+              </a:defRPr>
+            </a:lvl8pPr>
+            <a:lvl9pPr marL="3886200" indent="-228600" defTabSz="457200" eaLnBrk="0" fontAlgn="base" hangingPunct="0">
+              <a:spcBef>
+                <a:spcPct val="0"/>
+              </a:spcBef>
+              <a:spcAft>
+                <a:spcPct val="0"/>
+              </a:spcAft>
+              <a:tabLst>
+                <a:tab pos="723900" algn="l"/>
+                <a:tab pos="1447800" algn="l"/>
+                <a:tab pos="2171700" algn="l"/>
+                <a:tab pos="2895600" algn="l"/>
+                <a:tab pos="3619500" algn="l"/>
+                <a:tab pos="4343400" algn="l"/>
+                <a:tab pos="5067300" algn="l"/>
+                <a:tab pos="5791200" algn="l"/>
+                <a:tab pos="6515100" algn="l"/>
+                <a:tab pos="7239000" algn="l"/>
+                <a:tab pos="7962900" algn="l"/>
+              </a:tabLst>
+              <a:defRPr>
+                <a:solidFill>
+                  <a:schemeClr val="tx1"/>
+                </a:solidFill>
+                <a:latin typeface="Arial" panose="020B0604020202020204" pitchFamily="34" charset="0"/>
+                <a:ea typeface="Arial Unicode MS" pitchFamily="34" charset="-128"/>
+              </a:defRPr>
+            </a:lvl9pPr>
+          </a:lstStyle>
+          <a:p>
+            <a:pPr algn="ctr" eaLnBrk="1">
+              <a:lnSpc>
+                <a:spcPct val="93000"/>
+              </a:lnSpc>
+              <a:buClr>
+                <a:srgbClr val="000000"/>
+              </a:buClr>
+              <a:buSzPct val="100000"/>
+              <a:buFont typeface="Times New Roman" panose="02020603050405020304" pitchFamily="18" charset="0"/>
+              <a:buNone/>
+            </a:pPr>
+            <a:r>
+              <a:rPr lang="en-US" altLang="en-US" sz="2400">
+                <a:latin typeface="Courier New" panose="02070309020205020404" pitchFamily="49" charset="0"/>
+              </a:rPr>
+              <a:t>'Darwin'</a:t>
+            </a:r>
+            <a:endParaRPr lang="pt-BR" altLang="en-US" sz="2400">
+              <a:latin typeface="Courier New" panose="02070309020205020404" pitchFamily="49" charset="0"/>
+            </a:endParaRPr>
+          </a:p>
+        </p:txBody>
+      </p:sp>
+      <p:sp>
+        <p:nvSpPr>
+          <p:cNvPr id="21" name="Text Box 4"/>
+          <p:cNvSpPr txBox="1">
+            <a:spLocks noChangeArrowheads="1"/>
+          </p:cNvSpPr>
+          <p:nvPr/>
+        </p:nvSpPr>
+        <p:spPr bwMode="auto">
+          <a:xfrm>
+            <a:off x="544513" y="773113"/>
+            <a:ext cx="6615112" cy="671512"/>
+          </a:xfrm>
+          <a:prstGeom prst="rect">
+            <a:avLst/>
+          </a:prstGeom>
+          <a:noFill/>
+          <a:ln>
+            <a:noFill/>
+          </a:ln>
+          <a:extLst>
+            <a:ext uri="{909E8E84-426E-40DD-AFC4-6F175D3DCCD1}">
+              <a14:hiddenFill xmlns:a14="http://schemas.microsoft.com/office/drawing/2010/main">
+                <a:solidFill>
+                  <a:srgbClr val="FFFFFF"/>
+                </a:solidFill>
+              </a14:hiddenFill>
+            </a:ext>
+            <a:ext uri="{91240B29-F687-4F45-9708-019B960494DF}">
+              <a14:hiddenLine xmlns:a14="http://schemas.microsoft.com/office/drawing/2010/main" w="9525">
+                <a:solidFill>
+                  <a:srgbClr val="000000"/>
+                </a:solidFill>
+                <a:miter lim="800000"/>
+                <a:headEnd/>
+                <a:tailEnd/>
+              </a14:hiddenLine>
+            </a:ext>
+          </a:extLst>
+        </p:spPr>
+        <p:txBody>
+          <a:bodyPr wrap="none">
+            <a:spAutoFit/>
+          </a:bodyPr>
+          <a:lstStyle>
+            <a:lvl1pPr marL="457200" indent="-457200">
+              <a:defRPr>
+                <a:solidFill>
+                  <a:schemeClr val="tx1"/>
+                </a:solidFill>
+                <a:latin typeface="Arial" panose="020B0604020202020204" pitchFamily="34" charset="0"/>
+                <a:ea typeface="Arial Unicode MS" pitchFamily="34" charset="-128"/>
+              </a:defRPr>
+            </a:lvl1pPr>
+            <a:lvl2pPr>
+              <a:defRPr>
+                <a:solidFill>
+                  <a:schemeClr val="tx1"/>
+                </a:solidFill>
+                <a:latin typeface="Arial" panose="020B0604020202020204" pitchFamily="34" charset="0"/>
+                <a:ea typeface="Arial Unicode MS" pitchFamily="34" charset="-128"/>
+              </a:defRPr>
+            </a:lvl2pPr>
+            <a:lvl3pPr>
+              <a:defRPr>
+                <a:solidFill>
+                  <a:schemeClr val="tx1"/>
+                </a:solidFill>
+                <a:latin typeface="Arial" panose="020B0604020202020204" pitchFamily="34" charset="0"/>
+                <a:ea typeface="Arial Unicode MS" pitchFamily="34" charset="-128"/>
+              </a:defRPr>
+            </a:lvl3pPr>
+            <a:lvl4pPr>
+              <a:defRPr>
+                <a:solidFill>
+                  <a:schemeClr val="tx1"/>
+                </a:solidFill>
+                <a:latin typeface="Arial" panose="020B0604020202020204" pitchFamily="34" charset="0"/>
+                <a:ea typeface="Arial Unicode MS" pitchFamily="34" charset="-128"/>
+              </a:defRPr>
+            </a:lvl4pPr>
+            <a:lvl5pPr>
+              <a:defRPr>
+                <a:solidFill>
+                  <a:schemeClr val="tx1"/>
+                </a:solidFill>
+                <a:latin typeface="Arial" panose="020B0604020202020204" pitchFamily="34" charset="0"/>
+                <a:ea typeface="Arial Unicode MS" pitchFamily="34" charset="-128"/>
+              </a:defRPr>
+            </a:lvl5pPr>
+            <a:lvl6pPr marL="2514600" indent="-228600" defTabSz="457200" eaLnBrk="0" fontAlgn="base" hangingPunct="0">
+              <a:spcBef>
+                <a:spcPct val="0"/>
+              </a:spcBef>
+              <a:spcAft>
+                <a:spcPct val="0"/>
+              </a:spcAft>
+              <a:defRPr>
+                <a:solidFill>
+                  <a:schemeClr val="tx1"/>
+                </a:solidFill>
+                <a:latin typeface="Arial" panose="020B0604020202020204" pitchFamily="34" charset="0"/>
+                <a:ea typeface="Arial Unicode MS" pitchFamily="34" charset="-128"/>
+              </a:defRPr>
+            </a:lvl6pPr>
+            <a:lvl7pPr marL="2971800" indent="-228600" defTabSz="457200" eaLnBrk="0" fontAlgn="base" hangingPunct="0">
+              <a:spcBef>
+                <a:spcPct val="0"/>
+              </a:spcBef>
+              <a:spcAft>
+                <a:spcPct val="0"/>
+              </a:spcAft>
+              <a:defRPr>
+                <a:solidFill>
+                  <a:schemeClr val="tx1"/>
+                </a:solidFill>
+                <a:latin typeface="Arial" panose="020B0604020202020204" pitchFamily="34" charset="0"/>
+                <a:ea typeface="Arial Unicode MS" pitchFamily="34" charset="-128"/>
+              </a:defRPr>
+            </a:lvl7pPr>
+            <a:lvl8pPr marL="3429000" indent="-228600" defTabSz="457200" eaLnBrk="0" fontAlgn="base" hangingPunct="0">
+              <a:spcBef>
+                <a:spcPct val="0"/>
+              </a:spcBef>
+              <a:spcAft>
+                <a:spcPct val="0"/>
+              </a:spcAft>
+              <a:defRPr>
+                <a:solidFill>
+                  <a:schemeClr val="tx1"/>
+                </a:solidFill>
+                <a:latin typeface="Arial" panose="020B0604020202020204" pitchFamily="34" charset="0"/>
+                <a:ea typeface="Arial Unicode MS" pitchFamily="34" charset="-128"/>
+              </a:defRPr>
+            </a:lvl8pPr>
+            <a:lvl9pPr marL="3886200" indent="-228600" defTabSz="457200" eaLnBrk="0" fontAlgn="base" hangingPunct="0">
+              <a:spcBef>
+                <a:spcPct val="0"/>
+              </a:spcBef>
+              <a:spcAft>
+                <a:spcPct val="0"/>
+              </a:spcAft>
+              <a:defRPr>
+                <a:solidFill>
+                  <a:schemeClr val="tx1"/>
+                </a:solidFill>
+                <a:latin typeface="Arial" panose="020B0604020202020204" pitchFamily="34" charset="0"/>
+                <a:ea typeface="Arial Unicode MS" pitchFamily="34" charset="-128"/>
+              </a:defRPr>
+            </a:lvl9pPr>
+          </a:lstStyle>
+          <a:p>
+            <a:pPr eaLnBrk="1">
+              <a:lnSpc>
+                <a:spcPct val="150000"/>
+              </a:lnSpc>
+              <a:buClr>
+                <a:srgbClr val="000000"/>
+              </a:buClr>
+              <a:buSzPct val="100000"/>
+              <a:buFont typeface="Times New Roman" panose="02020603050405020304" pitchFamily="18" charset="0"/>
+              <a:buNone/>
+            </a:pPr>
+            <a:r>
+              <a:rPr lang="en-US" altLang="en-US" sz="2800" dirty="0">
+                <a:latin typeface="Calibri" panose="020F0502020204030204" pitchFamily="34" charset="0"/>
+              </a:rPr>
+              <a:t>Note: entries are </a:t>
+            </a:r>
+            <a:r>
+              <a:rPr lang="en-US" altLang="en-US" sz="2800" i="1" dirty="0">
+                <a:latin typeface="Calibri" panose="020F0502020204030204" pitchFamily="34" charset="0"/>
+              </a:rPr>
+              <a:t>not</a:t>
+            </a:r>
+            <a:r>
+              <a:rPr lang="en-US" altLang="en-US" sz="2800" dirty="0">
+                <a:latin typeface="Calibri" panose="020F0502020204030204" pitchFamily="34" charset="0"/>
+              </a:rPr>
+              <a:t>  in any particular order</a:t>
+            </a:r>
+          </a:p>
+        </p:txBody>
+      </p:sp>
+    </p:spTree>
+    <p:extLst>
+      <p:ext uri="{BB962C8B-B14F-4D97-AF65-F5344CB8AC3E}">
+        <p14:creationId xmlns:p14="http://schemas.microsoft.com/office/powerpoint/2010/main" val="3409874175"/>
+      </p:ext>
+    </p:extLst>
+  </p:cSld>
+  <p:clrMapOvr>
+    <a:masterClrMapping/>
+  </p:clrMapOvr>
+</p:sld>
+</file>
+
+<file path=ppt/slides/slide4.xml><?xml version="1.0" encoding="utf-8"?>
+<p:sld xmlns:a="http://schemas.openxmlformats.org/drawingml/2006/main" xmlns:r="http://schemas.openxmlformats.org/officeDocument/2006/relationships" xmlns:p="http://schemas.openxmlformats.org/presentationml/2006/main">
+  <p:cSld>
+    <p:spTree>
+      <p:nvGrpSpPr>
+        <p:cNvPr id="1" name=""/>
+        <p:cNvGrpSpPr/>
+        <p:nvPr/>
+      </p:nvGrpSpPr>
+      <p:grpSpPr>
+        <a:xfrm>
+          <a:off x="0" y="0"/>
+          <a:ext cx="0" cy="0"/>
+          <a:chOff x="0" y="0"/>
+          <a:chExt cx="0" cy="0"/>
+        </a:xfrm>
+      </p:grpSpPr>
+      <p:sp>
+        <p:nvSpPr>
           <p:cNvPr id="13314" name="Title 1"/>
           <p:cNvSpPr>
             <a:spLocks noGrp="1"/>
@@ -6898,7 +8801,7 @@
 </p:sld>
 </file>
 
-<file path=ppt/slides/slide4.xml><?xml version="1.0" encoding="utf-8"?>
+<file path=ppt/slides/slide5.xml><?xml version="1.0" encoding="utf-8"?>
 <p:sld xmlns:a="http://schemas.openxmlformats.org/drawingml/2006/main" xmlns:r="http://schemas.openxmlformats.org/officeDocument/2006/relationships" xmlns:p="http://schemas.openxmlformats.org/presentationml/2006/main">
   <p:cSld>
     <p:spTree>
@@ -7246,7 +9149,7 @@
 </p:sld>
 </file>
 
-<file path=ppt/slides/slide5.xml><?xml version="1.0" encoding="utf-8"?>
+<file path=ppt/slides/slide6.xml><?xml version="1.0" encoding="utf-8"?>
 <p:sld xmlns:a="http://schemas.openxmlformats.org/drawingml/2006/main" xmlns:r="http://schemas.openxmlformats.org/officeDocument/2006/relationships" xmlns:p="http://schemas.openxmlformats.org/presentationml/2006/main">
   <p:cSld>
     <p:spTree>
@@ -7505,7 +9408,7 @@
 </p:sld>
 </file>
 
-<file path=ppt/slides/slide6.xml><?xml version="1.0" encoding="utf-8"?>
+<file path=ppt/slides/slide7.xml><?xml version="1.0" encoding="utf-8"?>
 <p:sld xmlns:a="http://schemas.openxmlformats.org/drawingml/2006/main" xmlns:r="http://schemas.openxmlformats.org/officeDocument/2006/relationships" xmlns:p="http://schemas.openxmlformats.org/presentationml/2006/main">
   <p:cSld>
     <p:spTree>
@@ -7831,7 +9734,7 @@
 </p:sld>
 </file>
 
-<file path=ppt/slides/slide7.xml><?xml version="1.0" encoding="utf-8"?>
+<file path=ppt/slides/slide8.xml><?xml version="1.0" encoding="utf-8"?>
 <p:sld xmlns:a="http://schemas.openxmlformats.org/drawingml/2006/main" xmlns:r="http://schemas.openxmlformats.org/officeDocument/2006/relationships" xmlns:p="http://schemas.openxmlformats.org/presentationml/2006/main">
   <p:cSld>
     <p:spTree>
@@ -8258,7 +10161,7 @@
 </p:sld>
 </file>
 
-<file path=ppt/slides/slide8.xml><?xml version="1.0" encoding="utf-8"?>
+<file path=ppt/slides/slide9.xml><?xml version="1.0" encoding="utf-8"?>
 <p:sld xmlns:a="http://schemas.openxmlformats.org/drawingml/2006/main" xmlns:r="http://schemas.openxmlformats.org/officeDocument/2006/relationships" xmlns:p="http://schemas.openxmlformats.org/presentationml/2006/main">
   <p:cSld>
     <p:spTree>
@@ -8500,512 +10403,6 @@
                 <a:cs typeface="Courier New" panose="02070309020205020404" pitchFamily="49" charset="0"/>
               </a:rPr>
               <a:t>identical</a:t>
-            </a:r>
-          </a:p>
-        </p:txBody>
-      </p:sp>
-    </p:spTree>
-  </p:cSld>
-  <p:clrMapOvr>
-    <a:masterClrMapping/>
-  </p:clrMapOvr>
-  <p:transition spd="slow"/>
-</p:sld>
-</file>
-
-<file path=ppt/slides/slide9.xml><?xml version="1.0" encoding="utf-8"?>
-<p:sld xmlns:a="http://schemas.openxmlformats.org/drawingml/2006/main" xmlns:r="http://schemas.openxmlformats.org/officeDocument/2006/relationships" xmlns:p="http://schemas.openxmlformats.org/presentationml/2006/main">
-  <p:cSld>
-    <p:spTree>
-      <p:nvGrpSpPr>
-        <p:cNvPr id="1" name=""/>
-        <p:cNvGrpSpPr/>
-        <p:nvPr/>
-      </p:nvGrpSpPr>
-      <p:grpSpPr>
-        <a:xfrm>
-          <a:off x="0" y="0"/>
-          <a:ext cx="0" cy="0"/>
-          <a:chOff x="0" y="0"/>
-          <a:chExt cx="0" cy="0"/>
-        </a:xfrm>
-      </p:grpSpPr>
-      <p:sp>
-        <p:nvSpPr>
-          <p:cNvPr id="3" name="Text Placeholder 2"/>
-          <p:cNvSpPr txBox="1">
-            <a:spLocks noGrp="1"/>
-          </p:cNvSpPr>
-          <p:nvPr>
-            <p:ph type="body" idx="4294967295"/>
-          </p:nvPr>
-        </p:nvSpPr>
-        <p:spPr>
-          <a:xfrm>
-            <a:off x="471488" y="1125538"/>
-            <a:ext cx="8228012" cy="4403725"/>
-          </a:xfrm>
-        </p:spPr>
-        <p:txBody>
-          <a:bodyPr rtlCol="0">
-            <a:normAutofit/>
-          </a:bodyPr>
-          <a:lstStyle/>
-          <a:p>
-            <a:pPr eaLnBrk="1" fontAlgn="auto" hangingPunct="1">
-              <a:spcAft>
-                <a:spcPts val="0"/>
-              </a:spcAft>
-              <a:defRPr/>
-            </a:pPr>
-            <a:r>
-              <a:rPr lang="en-GB" dirty="0">
-                <a:latin typeface="Nimbus Sans L" pitchFamily="34"/>
-              </a:rPr>
-              <a:t>returning a new set</a:t>
-            </a:r>
-            <a:br>
-              <a:rPr lang="en-GB" dirty="0">
-                <a:latin typeface="Nimbus Sans L" pitchFamily="34"/>
-              </a:rPr>
-            </a:br>
-            <a:endParaRPr lang="en-GB" sz="1400" dirty="0" smtClean="0">
-              <a:latin typeface="Nimbus Sans L" pitchFamily="34"/>
-            </a:endParaRPr>
-          </a:p>
-          <a:p>
-            <a:pPr marL="0" indent="0" eaLnBrk="1" fontAlgn="auto" hangingPunct="1">
-              <a:spcAft>
-                <a:spcPts val="0"/>
-              </a:spcAft>
-              <a:buFont typeface="Arial" panose="020B0604020202020204" pitchFamily="34" charset="0"/>
-              <a:buNone/>
-              <a:defRPr/>
-            </a:pPr>
-            <a:r>
-              <a:rPr lang="en-GB" sz="2400" dirty="0" smtClean="0">
-                <a:latin typeface="Courier New" panose="02070309020205020404" pitchFamily="49" charset="0"/>
-                <a:cs typeface="Courier New" panose="02070309020205020404" pitchFamily="49" charset="0"/>
-              </a:rPr>
-              <a:t>a </a:t>
-            </a:r>
-            <a:r>
-              <a:rPr lang="en-GB" sz="2400" dirty="0">
-                <a:latin typeface="Courier New" panose="02070309020205020404" pitchFamily="49" charset="0"/>
-                <a:cs typeface="Courier New" panose="02070309020205020404" pitchFamily="49" charset="0"/>
-              </a:rPr>
-              <a:t>= { 2, 3 }</a:t>
-            </a:r>
-          </a:p>
-          <a:p>
-            <a:pPr marL="0" indent="0" eaLnBrk="1" fontAlgn="auto" hangingPunct="1">
-              <a:spcAft>
-                <a:spcPts val="0"/>
-              </a:spcAft>
-              <a:buFont typeface="Arial" panose="020B0604020202020204" pitchFamily="34" charset="0"/>
-              <a:buNone/>
-              <a:defRPr/>
-            </a:pPr>
-            <a:r>
-              <a:rPr lang="en-GB" sz="2400" dirty="0">
-                <a:latin typeface="Courier New" panose="02070309020205020404" pitchFamily="49" charset="0"/>
-                <a:cs typeface="Courier New" panose="02070309020205020404" pitchFamily="49" charset="0"/>
-              </a:rPr>
-              <a:t>b = { 3, 4 }</a:t>
-            </a:r>
-            <a:br>
-              <a:rPr lang="en-GB" sz="2400" dirty="0">
-                <a:latin typeface="Courier New" panose="02070309020205020404" pitchFamily="49" charset="0"/>
-                <a:cs typeface="Courier New" panose="02070309020205020404" pitchFamily="49" charset="0"/>
-              </a:rPr>
-            </a:br>
-            <a:endParaRPr lang="en-GB" sz="2400" dirty="0">
-              <a:latin typeface="Courier New" panose="02070309020205020404" pitchFamily="49" charset="0"/>
-              <a:cs typeface="Courier New" panose="02070309020205020404" pitchFamily="49" charset="0"/>
-            </a:endParaRPr>
-          </a:p>
-          <a:p>
-            <a:pPr marL="0" indent="0" eaLnBrk="1" fontAlgn="auto" hangingPunct="1">
-              <a:spcAft>
-                <a:spcPts val="0"/>
-              </a:spcAft>
-              <a:buFont typeface="Arial" panose="020B0604020202020204" pitchFamily="34" charset="0"/>
-              <a:buNone/>
-              <a:defRPr/>
-            </a:pPr>
-            <a:r>
-              <a:rPr lang="en-GB" sz="2400" dirty="0">
-                <a:latin typeface="Courier New" panose="02070309020205020404" pitchFamily="49" charset="0"/>
-                <a:cs typeface="Courier New" panose="02070309020205020404" pitchFamily="49" charset="0"/>
-              </a:rPr>
-              <a:t>a | b    </a:t>
-            </a:r>
-            <a:r>
-              <a:rPr lang="en-GB" sz="2400" dirty="0" err="1">
-                <a:latin typeface="Courier New" panose="02070309020205020404" pitchFamily="49" charset="0"/>
-                <a:cs typeface="Courier New" panose="02070309020205020404" pitchFamily="49" charset="0"/>
-              </a:rPr>
-              <a:t>a.union</a:t>
-            </a:r>
-            <a:r>
-              <a:rPr lang="en-GB" sz="2400" dirty="0">
-                <a:latin typeface="Courier New" panose="02070309020205020404" pitchFamily="49" charset="0"/>
-                <a:cs typeface="Courier New" panose="02070309020205020404" pitchFamily="49" charset="0"/>
-              </a:rPr>
-              <a:t>(b)              </a:t>
-            </a:r>
-            <a:r>
-              <a:rPr lang="en-GB" sz="2400" i="1" dirty="0">
-                <a:solidFill>
-                  <a:srgbClr val="008000"/>
-                </a:solidFill>
-                <a:latin typeface="Courier New" panose="02070309020205020404" pitchFamily="49" charset="0"/>
-                <a:cs typeface="Courier New" panose="02070309020205020404" pitchFamily="49" charset="0"/>
-              </a:rPr>
-              <a:t>{2, 3, 4}</a:t>
-            </a:r>
-            <a:br>
-              <a:rPr lang="en-GB" sz="2400" i="1" dirty="0">
-                <a:solidFill>
-                  <a:srgbClr val="008000"/>
-                </a:solidFill>
-                <a:latin typeface="Courier New" panose="02070309020205020404" pitchFamily="49" charset="0"/>
-                <a:cs typeface="Courier New" panose="02070309020205020404" pitchFamily="49" charset="0"/>
-              </a:rPr>
-            </a:br>
-            <a:r>
-              <a:rPr lang="en-GB" sz="2400" dirty="0">
-                <a:latin typeface="Courier New" panose="02070309020205020404" pitchFamily="49" charset="0"/>
-                <a:cs typeface="Courier New" panose="02070309020205020404" pitchFamily="49" charset="0"/>
-              </a:rPr>
-              <a:t>a &amp; b    </a:t>
-            </a:r>
-            <a:r>
-              <a:rPr lang="en-GB" sz="2400" dirty="0" err="1">
-                <a:latin typeface="Courier New" panose="02070309020205020404" pitchFamily="49" charset="0"/>
-                <a:cs typeface="Courier New" panose="02070309020205020404" pitchFamily="49" charset="0"/>
-              </a:rPr>
-              <a:t>a.intersection</a:t>
-            </a:r>
-            <a:r>
-              <a:rPr lang="en-GB" sz="2400" dirty="0">
-                <a:latin typeface="Courier New" panose="02070309020205020404" pitchFamily="49" charset="0"/>
-                <a:cs typeface="Courier New" panose="02070309020205020404" pitchFamily="49" charset="0"/>
-              </a:rPr>
-              <a:t>(b)             </a:t>
-            </a:r>
-            <a:r>
-              <a:rPr lang="en-GB" sz="2400" i="1" dirty="0">
-                <a:solidFill>
-                  <a:srgbClr val="008000"/>
-                </a:solidFill>
-                <a:latin typeface="Courier New" panose="02070309020205020404" pitchFamily="49" charset="0"/>
-                <a:cs typeface="Courier New" panose="02070309020205020404" pitchFamily="49" charset="0"/>
-              </a:rPr>
-              <a:t>{3}</a:t>
-            </a:r>
-            <a:r>
-              <a:rPr lang="en-GB" sz="2400" dirty="0">
-                <a:latin typeface="Courier New" panose="02070309020205020404" pitchFamily="49" charset="0"/>
-                <a:cs typeface="Courier New" panose="02070309020205020404" pitchFamily="49" charset="0"/>
-              </a:rPr>
-              <a:t/>
-            </a:r>
-            <a:br>
-              <a:rPr lang="en-GB" sz="2400" dirty="0">
-                <a:latin typeface="Courier New" panose="02070309020205020404" pitchFamily="49" charset="0"/>
-                <a:cs typeface="Courier New" panose="02070309020205020404" pitchFamily="49" charset="0"/>
-              </a:rPr>
-            </a:br>
-            <a:r>
-              <a:rPr lang="en-GB" sz="2400" dirty="0">
-                <a:latin typeface="Courier New" panose="02070309020205020404" pitchFamily="49" charset="0"/>
-                <a:cs typeface="Courier New" panose="02070309020205020404" pitchFamily="49" charset="0"/>
-              </a:rPr>
-              <a:t>a - b    </a:t>
-            </a:r>
-            <a:r>
-              <a:rPr lang="en-GB" sz="2400" dirty="0" err="1">
-                <a:latin typeface="Courier New" panose="02070309020205020404" pitchFamily="49" charset="0"/>
-                <a:cs typeface="Courier New" panose="02070309020205020404" pitchFamily="49" charset="0"/>
-              </a:rPr>
-              <a:t>a.difference</a:t>
-            </a:r>
-            <a:r>
-              <a:rPr lang="en-GB" sz="2400" dirty="0">
-                <a:latin typeface="Courier New" panose="02070309020205020404" pitchFamily="49" charset="0"/>
-                <a:cs typeface="Courier New" panose="02070309020205020404" pitchFamily="49" charset="0"/>
-              </a:rPr>
-              <a:t>(b)               </a:t>
-            </a:r>
-            <a:r>
-              <a:rPr lang="en-GB" sz="2400" i="1" dirty="0">
-                <a:solidFill>
-                  <a:srgbClr val="008000"/>
-                </a:solidFill>
-                <a:latin typeface="Courier New" panose="02070309020205020404" pitchFamily="49" charset="0"/>
-                <a:cs typeface="Courier New" panose="02070309020205020404" pitchFamily="49" charset="0"/>
-              </a:rPr>
-              <a:t>{2}</a:t>
-            </a:r>
-            <a:r>
-              <a:rPr lang="en-GB" sz="2400" dirty="0">
-                <a:latin typeface="Courier New" panose="02070309020205020404" pitchFamily="49" charset="0"/>
-                <a:cs typeface="Courier New" panose="02070309020205020404" pitchFamily="49" charset="0"/>
-              </a:rPr>
-              <a:t/>
-            </a:r>
-            <a:br>
-              <a:rPr lang="en-GB" sz="2400" dirty="0">
-                <a:latin typeface="Courier New" panose="02070309020205020404" pitchFamily="49" charset="0"/>
-                <a:cs typeface="Courier New" panose="02070309020205020404" pitchFamily="49" charset="0"/>
-              </a:rPr>
-            </a:br>
-            <a:r>
-              <a:rPr lang="en-GB" sz="2400" dirty="0">
-                <a:latin typeface="Courier New" panose="02070309020205020404" pitchFamily="49" charset="0"/>
-                <a:cs typeface="Courier New" panose="02070309020205020404" pitchFamily="49" charset="0"/>
-              </a:rPr>
-              <a:t>a ^ b    </a:t>
-            </a:r>
-            <a:r>
-              <a:rPr lang="en-GB" sz="2400" dirty="0" err="1">
-                <a:latin typeface="Courier New" panose="02070309020205020404" pitchFamily="49" charset="0"/>
-                <a:cs typeface="Courier New" panose="02070309020205020404" pitchFamily="49" charset="0"/>
-              </a:rPr>
-              <a:t>a.symmetric_difference</a:t>
-            </a:r>
-            <a:r>
-              <a:rPr lang="en-GB" sz="2400" dirty="0">
-                <a:latin typeface="Courier New" panose="02070309020205020404" pitchFamily="49" charset="0"/>
-                <a:cs typeface="Courier New" panose="02070309020205020404" pitchFamily="49" charset="0"/>
-              </a:rPr>
-              <a:t>(b)  </a:t>
-            </a:r>
-            <a:r>
-              <a:rPr lang="en-GB" sz="2400" i="1" dirty="0">
-                <a:solidFill>
-                  <a:srgbClr val="008000"/>
-                </a:solidFill>
-                <a:latin typeface="Courier New" panose="02070309020205020404" pitchFamily="49" charset="0"/>
-                <a:cs typeface="Courier New" panose="02070309020205020404" pitchFamily="49" charset="0"/>
-              </a:rPr>
-              <a:t>{2, 4}</a:t>
-            </a:r>
-          </a:p>
-        </p:txBody>
-      </p:sp>
-      <p:sp>
-        <p:nvSpPr>
-          <p:cNvPr id="25603" name="Title 1"/>
-          <p:cNvSpPr txBox="1">
-            <a:spLocks/>
-          </p:cNvSpPr>
-          <p:nvPr/>
-        </p:nvSpPr>
-        <p:spPr bwMode="auto">
-          <a:xfrm>
-            <a:off x="468313" y="115888"/>
-            <a:ext cx="8229600" cy="1143000"/>
-          </a:xfrm>
-          <a:prstGeom prst="rect">
-            <a:avLst/>
-          </a:prstGeom>
-          <a:noFill/>
-          <a:ln>
-            <a:noFill/>
-          </a:ln>
-          <a:extLst>
-            <a:ext uri="{909E8E84-426E-40DD-AFC4-6F175D3DCCD1}">
-              <a14:hiddenFill xmlns:a14="http://schemas.microsoft.com/office/drawing/2010/main">
-                <a:solidFill>
-                  <a:srgbClr val="FFFFFF"/>
-                </a:solidFill>
-              </a14:hiddenFill>
-            </a:ext>
-            <a:ext uri="{91240B29-F687-4F45-9708-019B960494DF}">
-              <a14:hiddenLine xmlns:a14="http://schemas.microsoft.com/office/drawing/2010/main" w="9525">
-                <a:solidFill>
-                  <a:srgbClr val="000000"/>
-                </a:solidFill>
-                <a:miter lim="800000"/>
-                <a:headEnd/>
-                <a:tailEnd/>
-              </a14:hiddenLine>
-            </a:ext>
-          </a:extLst>
-        </p:spPr>
-        <p:txBody>
-          <a:bodyPr anchor="ctr"/>
-          <a:lstStyle>
-            <a:lvl1pPr>
-              <a:lnSpc>
-                <a:spcPct val="90000"/>
-              </a:lnSpc>
-              <a:spcBef>
-                <a:spcPts val="1000"/>
-              </a:spcBef>
-              <a:buFont typeface="Arial" panose="020B0604020202020204" pitchFamily="34" charset="0"/>
-              <a:buChar char="•"/>
-              <a:defRPr sz="2800">
-                <a:solidFill>
-                  <a:schemeClr val="tx1"/>
-                </a:solidFill>
-                <a:latin typeface="Calibri" panose="020F0502020204030204" pitchFamily="34" charset="0"/>
-              </a:defRPr>
-            </a:lvl1pPr>
-            <a:lvl2pPr marL="685800" indent="-228600">
-              <a:lnSpc>
-                <a:spcPct val="90000"/>
-              </a:lnSpc>
-              <a:spcBef>
-                <a:spcPts val="500"/>
-              </a:spcBef>
-              <a:buFont typeface="Arial" panose="020B0604020202020204" pitchFamily="34" charset="0"/>
-              <a:buChar char="•"/>
-              <a:defRPr sz="2400">
-                <a:solidFill>
-                  <a:schemeClr val="tx1"/>
-                </a:solidFill>
-                <a:latin typeface="Calibri" panose="020F0502020204030204" pitchFamily="34" charset="0"/>
-              </a:defRPr>
-            </a:lvl2pPr>
-            <a:lvl3pPr marL="1143000" indent="-228600">
-              <a:lnSpc>
-                <a:spcPct val="90000"/>
-              </a:lnSpc>
-              <a:spcBef>
-                <a:spcPts val="500"/>
-              </a:spcBef>
-              <a:buFont typeface="Arial" panose="020B0604020202020204" pitchFamily="34" charset="0"/>
-              <a:buChar char="•"/>
-              <a:defRPr sz="2000">
-                <a:solidFill>
-                  <a:schemeClr val="tx1"/>
-                </a:solidFill>
-                <a:latin typeface="Calibri" panose="020F0502020204030204" pitchFamily="34" charset="0"/>
-              </a:defRPr>
-            </a:lvl3pPr>
-            <a:lvl4pPr marL="1600200" indent="-228600">
-              <a:lnSpc>
-                <a:spcPct val="90000"/>
-              </a:lnSpc>
-              <a:spcBef>
-                <a:spcPts val="500"/>
-              </a:spcBef>
-              <a:buFont typeface="Arial" panose="020B0604020202020204" pitchFamily="34" charset="0"/>
-              <a:buChar char="•"/>
-              <a:defRPr>
-                <a:solidFill>
-                  <a:schemeClr val="tx1"/>
-                </a:solidFill>
-                <a:latin typeface="Calibri" panose="020F0502020204030204" pitchFamily="34" charset="0"/>
-              </a:defRPr>
-            </a:lvl4pPr>
-            <a:lvl5pPr marL="2057400" indent="-228600">
-              <a:lnSpc>
-                <a:spcPct val="90000"/>
-              </a:lnSpc>
-              <a:spcBef>
-                <a:spcPts val="500"/>
-              </a:spcBef>
-              <a:buFont typeface="Arial" panose="020B0604020202020204" pitchFamily="34" charset="0"/>
-              <a:buChar char="•"/>
-              <a:defRPr>
-                <a:solidFill>
-                  <a:schemeClr val="tx1"/>
-                </a:solidFill>
-                <a:latin typeface="Calibri" panose="020F0502020204030204" pitchFamily="34" charset="0"/>
-              </a:defRPr>
-            </a:lvl5pPr>
-            <a:lvl6pPr marL="2514600" indent="-228600" eaLnBrk="0" fontAlgn="base" hangingPunct="0">
-              <a:lnSpc>
-                <a:spcPct val="90000"/>
-              </a:lnSpc>
-              <a:spcBef>
-                <a:spcPts val="500"/>
-              </a:spcBef>
-              <a:spcAft>
-                <a:spcPct val="0"/>
-              </a:spcAft>
-              <a:buFont typeface="Arial" panose="020B0604020202020204" pitchFamily="34" charset="0"/>
-              <a:buChar char="•"/>
-              <a:defRPr>
-                <a:solidFill>
-                  <a:schemeClr val="tx1"/>
-                </a:solidFill>
-                <a:latin typeface="Calibri" panose="020F0502020204030204" pitchFamily="34" charset="0"/>
-              </a:defRPr>
-            </a:lvl6pPr>
-            <a:lvl7pPr marL="2971800" indent="-228600" eaLnBrk="0" fontAlgn="base" hangingPunct="0">
-              <a:lnSpc>
-                <a:spcPct val="90000"/>
-              </a:lnSpc>
-              <a:spcBef>
-                <a:spcPts val="500"/>
-              </a:spcBef>
-              <a:spcAft>
-                <a:spcPct val="0"/>
-              </a:spcAft>
-              <a:buFont typeface="Arial" panose="020B0604020202020204" pitchFamily="34" charset="0"/>
-              <a:buChar char="•"/>
-              <a:defRPr>
-                <a:solidFill>
-                  <a:schemeClr val="tx1"/>
-                </a:solidFill>
-                <a:latin typeface="Calibri" panose="020F0502020204030204" pitchFamily="34" charset="0"/>
-              </a:defRPr>
-            </a:lvl7pPr>
-            <a:lvl8pPr marL="3429000" indent="-228600" eaLnBrk="0" fontAlgn="base" hangingPunct="0">
-              <a:lnSpc>
-                <a:spcPct val="90000"/>
-              </a:lnSpc>
-              <a:spcBef>
-                <a:spcPts val="500"/>
-              </a:spcBef>
-              <a:spcAft>
-                <a:spcPct val="0"/>
-              </a:spcAft>
-              <a:buFont typeface="Arial" panose="020B0604020202020204" pitchFamily="34" charset="0"/>
-              <a:buChar char="•"/>
-              <a:defRPr>
-                <a:solidFill>
-                  <a:schemeClr val="tx1"/>
-                </a:solidFill>
-                <a:latin typeface="Calibri" panose="020F0502020204030204" pitchFamily="34" charset="0"/>
-              </a:defRPr>
-            </a:lvl8pPr>
-            <a:lvl9pPr marL="3886200" indent="-228600" eaLnBrk="0" fontAlgn="base" hangingPunct="0">
-              <a:lnSpc>
-                <a:spcPct val="90000"/>
-              </a:lnSpc>
-              <a:spcBef>
-                <a:spcPts val="500"/>
-              </a:spcBef>
-              <a:spcAft>
-                <a:spcPct val="0"/>
-              </a:spcAft>
-              <a:buFont typeface="Arial" panose="020B0604020202020204" pitchFamily="34" charset="0"/>
-              <a:buChar char="•"/>
-              <a:defRPr>
-                <a:solidFill>
-                  <a:schemeClr val="tx1"/>
-                </a:solidFill>
-                <a:latin typeface="Calibri" panose="020F0502020204030204" pitchFamily="34" charset="0"/>
-              </a:defRPr>
-            </a:lvl9pPr>
-          </a:lstStyle>
-          <a:p>
-            <a:pPr algn="ctr" eaLnBrk="1" hangingPunct="1">
-              <a:spcBef>
-                <a:spcPct val="0"/>
-              </a:spcBef>
-              <a:buFontTx/>
-              <a:buNone/>
-            </a:pPr>
-            <a:r>
-              <a:rPr lang="en-GB" altLang="en-US" sz="3200"/>
-              <a:t>Set combinators</a:t>
             </a:r>
           </a:p>
         </p:txBody>

</xml_diff>